<commit_message>
add the rest of content
</commit_message>
<xml_diff>
--- a/tasks/week-01/hashing.pptx
+++ b/tasks/week-01/hashing.pptx
@@ -5,7 +5,7 @@
     <p:sldMasterId id="2147483674" r:id="rId1"/>
   </p:sldMasterIdLst>
   <p:notesMasterIdLst>
-    <p:notesMasterId r:id="rId32"/>
+    <p:notesMasterId r:id="rId43"/>
   </p:notesMasterIdLst>
   <p:sldIdLst>
     <p:sldId id="256" r:id="rId2"/>
@@ -19,25 +19,36 @@
     <p:sldId id="264" r:id="rId10"/>
     <p:sldId id="265" r:id="rId11"/>
     <p:sldId id="269" r:id="rId12"/>
-    <p:sldId id="270" r:id="rId13"/>
-    <p:sldId id="266" r:id="rId14"/>
-    <p:sldId id="271" r:id="rId15"/>
-    <p:sldId id="272" r:id="rId16"/>
-    <p:sldId id="273" r:id="rId17"/>
-    <p:sldId id="276" r:id="rId18"/>
-    <p:sldId id="277" r:id="rId19"/>
-    <p:sldId id="278" r:id="rId20"/>
-    <p:sldId id="279" r:id="rId21"/>
-    <p:sldId id="267" r:id="rId22"/>
-    <p:sldId id="280" r:id="rId23"/>
-    <p:sldId id="282" r:id="rId24"/>
-    <p:sldId id="283" r:id="rId25"/>
-    <p:sldId id="268" r:id="rId26"/>
-    <p:sldId id="284" r:id="rId27"/>
-    <p:sldId id="285" r:id="rId28"/>
-    <p:sldId id="286" r:id="rId29"/>
-    <p:sldId id="287" r:id="rId30"/>
-    <p:sldId id="288" r:id="rId31"/>
+    <p:sldId id="297" r:id="rId13"/>
+    <p:sldId id="298" r:id="rId14"/>
+    <p:sldId id="299" r:id="rId15"/>
+    <p:sldId id="300" r:id="rId16"/>
+    <p:sldId id="270" r:id="rId17"/>
+    <p:sldId id="294" r:id="rId18"/>
+    <p:sldId id="295" r:id="rId19"/>
+    <p:sldId id="296" r:id="rId20"/>
+    <p:sldId id="266" r:id="rId21"/>
+    <p:sldId id="271" r:id="rId22"/>
+    <p:sldId id="272" r:id="rId23"/>
+    <p:sldId id="273" r:id="rId24"/>
+    <p:sldId id="276" r:id="rId25"/>
+    <p:sldId id="277" r:id="rId26"/>
+    <p:sldId id="278" r:id="rId27"/>
+    <p:sldId id="279" r:id="rId28"/>
+    <p:sldId id="267" r:id="rId29"/>
+    <p:sldId id="280" r:id="rId30"/>
+    <p:sldId id="282" r:id="rId31"/>
+    <p:sldId id="283" r:id="rId32"/>
+    <p:sldId id="268" r:id="rId33"/>
+    <p:sldId id="284" r:id="rId34"/>
+    <p:sldId id="285" r:id="rId35"/>
+    <p:sldId id="286" r:id="rId36"/>
+    <p:sldId id="287" r:id="rId37"/>
+    <p:sldId id="288" r:id="rId38"/>
+    <p:sldId id="289" r:id="rId39"/>
+    <p:sldId id="290" r:id="rId40"/>
+    <p:sldId id="291" r:id="rId41"/>
+    <p:sldId id="293" r:id="rId42"/>
   </p:sldIdLst>
   <p:sldSz cx="12192000" cy="6858000"/>
   <p:notesSz cx="6858000" cy="9144000"/>
@@ -2809,10 +2820,10 @@
             </a:lnSpc>
           </a:pPr>
           <a:r>
-            <a:rPr lang="en-US" b="0" i="0"/>
+            <a:rPr lang="en-US" b="0" i="0" dirty="0"/>
             <a:t>Hash functions play a crucial role in securing passwords. Instead of storing actual passwords, systems store the hash values, adding an extra layer of security.</a:t>
           </a:r>
-          <a:endParaRPr lang="en-US"/>
+          <a:endParaRPr lang="en-US" dirty="0"/>
         </a:p>
       </dgm:t>
     </dgm:pt>
@@ -3641,7 +3652,7 @@
         <a:lstStyle/>
         <a:p>
           <a:r>
-            <a:rPr lang="en-US" sz="2400"/>
+            <a:rPr lang="en-US" sz="2400" dirty="0"/>
             <a:t>SHA-3</a:t>
           </a:r>
         </a:p>
@@ -3669,6 +3680,42 @@
         </a:p>
       </dgm:t>
     </dgm:pt>
+    <dgm:pt modelId="{919FEB44-10AF-46F9-8C02-167085785719}">
+      <dgm:prSet custT="1"/>
+      <dgm:spPr/>
+      <dgm:t>
+        <a:bodyPr anchor="ctr"/>
+        <a:lstStyle/>
+        <a:p>
+          <a:r>
+            <a:rPr lang="en-US" sz="2800" dirty="0"/>
+            <a:t>Tiger</a:t>
+          </a:r>
+        </a:p>
+      </dgm:t>
+    </dgm:pt>
+    <dgm:pt modelId="{D4AF8475-50F7-455F-BD44-FAA8D7AEA35F}" type="parTrans" cxnId="{5593A027-9467-4CB1-BF0B-FBC9FCE2C1A3}">
+      <dgm:prSet/>
+      <dgm:spPr/>
+      <dgm:t>
+        <a:bodyPr/>
+        <a:lstStyle/>
+        <a:p>
+          <a:endParaRPr lang="en-US"/>
+        </a:p>
+      </dgm:t>
+    </dgm:pt>
+    <dgm:pt modelId="{DED11AB6-5569-492C-A843-598041C15D29}" type="sibTrans" cxnId="{5593A027-9467-4CB1-BF0B-FBC9FCE2C1A3}">
+      <dgm:prSet/>
+      <dgm:spPr/>
+      <dgm:t>
+        <a:bodyPr/>
+        <a:lstStyle/>
+        <a:p>
+          <a:endParaRPr lang="en-US"/>
+        </a:p>
+      </dgm:t>
+    </dgm:pt>
     <dgm:pt modelId="{F75BB7CF-56B4-4E6B-9A84-97B053B6AD83}" type="pres">
       <dgm:prSet presAssocID="{CA5A826B-413C-44B5-8D6E-2BB8AB2324B0}" presName="vert0" presStyleCnt="0">
         <dgm:presLayoutVars>
@@ -3680,7 +3727,7 @@
       <dgm:spPr/>
     </dgm:pt>
     <dgm:pt modelId="{5A8F6734-E4C6-4721-B34F-5B74471D3836}" type="pres">
-      <dgm:prSet presAssocID="{A1BC36EA-0E65-4019-B8E3-B9E5E06A184E}" presName="thickLine" presStyleLbl="alignNode1" presStyleIdx="0" presStyleCnt="4"/>
+      <dgm:prSet presAssocID="{A1BC36EA-0E65-4019-B8E3-B9E5E06A184E}" presName="thickLine" presStyleLbl="alignNode1" presStyleIdx="0" presStyleCnt="5"/>
       <dgm:spPr/>
     </dgm:pt>
     <dgm:pt modelId="{BA3D851B-5729-4741-A698-C4480994D887}" type="pres">
@@ -3688,7 +3735,7 @@
       <dgm:spPr/>
     </dgm:pt>
     <dgm:pt modelId="{AD3E5496-B533-4428-8A72-132F47829269}" type="pres">
-      <dgm:prSet presAssocID="{A1BC36EA-0E65-4019-B8E3-B9E5E06A184E}" presName="tx1" presStyleLbl="revTx" presStyleIdx="0" presStyleCnt="7" custScaleX="178664"/>
+      <dgm:prSet presAssocID="{A1BC36EA-0E65-4019-B8E3-B9E5E06A184E}" presName="tx1" presStyleLbl="revTx" presStyleIdx="0" presStyleCnt="8" custScaleX="178664"/>
       <dgm:spPr/>
     </dgm:pt>
     <dgm:pt modelId="{A6C1DA20-CE14-4B28-9650-8247C5E2DD3E}" type="pres">
@@ -3696,7 +3743,7 @@
       <dgm:spPr/>
     </dgm:pt>
     <dgm:pt modelId="{5CB61063-B9E0-4A17-98D5-3681FB7CAEE8}" type="pres">
-      <dgm:prSet presAssocID="{5C19D2AE-3585-4F26-8F50-4E0A931E5EAB}" presName="thickLine" presStyleLbl="alignNode1" presStyleIdx="1" presStyleCnt="4"/>
+      <dgm:prSet presAssocID="{5C19D2AE-3585-4F26-8F50-4E0A931E5EAB}" presName="thickLine" presStyleLbl="alignNode1" presStyleIdx="1" presStyleCnt="5"/>
       <dgm:spPr/>
     </dgm:pt>
     <dgm:pt modelId="{2B8A8546-EF3E-4DAE-8648-7090AF091AB9}" type="pres">
@@ -3704,7 +3751,7 @@
       <dgm:spPr/>
     </dgm:pt>
     <dgm:pt modelId="{E67D1EEA-8B46-4F46-BDF8-9E08C6AC7121}" type="pres">
-      <dgm:prSet presAssocID="{5C19D2AE-3585-4F26-8F50-4E0A931E5EAB}" presName="tx1" presStyleLbl="revTx" presStyleIdx="1" presStyleCnt="7" custScaleX="178664"/>
+      <dgm:prSet presAssocID="{5C19D2AE-3585-4F26-8F50-4E0A931E5EAB}" presName="tx1" presStyleLbl="revTx" presStyleIdx="1" presStyleCnt="8" custScaleX="178664"/>
       <dgm:spPr/>
     </dgm:pt>
     <dgm:pt modelId="{145505A2-08F4-465A-888D-0FCAD7E9F8D3}" type="pres">
@@ -3712,7 +3759,7 @@
       <dgm:spPr/>
     </dgm:pt>
     <dgm:pt modelId="{C50F4BF3-78C5-4EBD-8F1A-862A32842590}" type="pres">
-      <dgm:prSet presAssocID="{027EB0C5-B406-4BF9-9378-3AEA0ADBA593}" presName="thickLine" presStyleLbl="alignNode1" presStyleIdx="2" presStyleCnt="4"/>
+      <dgm:prSet presAssocID="{027EB0C5-B406-4BF9-9378-3AEA0ADBA593}" presName="thickLine" presStyleLbl="alignNode1" presStyleIdx="2" presStyleCnt="5"/>
       <dgm:spPr/>
     </dgm:pt>
     <dgm:pt modelId="{00C9BEE7-FD81-4A91-89A0-7F14C3F65CC5}" type="pres">
@@ -3720,7 +3767,7 @@
       <dgm:spPr/>
     </dgm:pt>
     <dgm:pt modelId="{B33A5476-265F-48D5-9F41-598B6135C36F}" type="pres">
-      <dgm:prSet presAssocID="{027EB0C5-B406-4BF9-9378-3AEA0ADBA593}" presName="tx1" presStyleLbl="revTx" presStyleIdx="2" presStyleCnt="7" custScaleX="178664"/>
+      <dgm:prSet presAssocID="{027EB0C5-B406-4BF9-9378-3AEA0ADBA593}" presName="tx1" presStyleLbl="revTx" presStyleIdx="2" presStyleCnt="8" custScaleX="178664"/>
       <dgm:spPr/>
     </dgm:pt>
     <dgm:pt modelId="{142E4719-DE3E-4E59-97AB-6F46E5DC3A74}" type="pres">
@@ -3728,7 +3775,7 @@
       <dgm:spPr/>
     </dgm:pt>
     <dgm:pt modelId="{431F3373-B7D8-4D24-A508-51BBB0666800}" type="pres">
-      <dgm:prSet presAssocID="{A89E0B09-4E81-4A5B-9B01-3A2004B8F646}" presName="thickLine" presStyleLbl="alignNode1" presStyleIdx="3" presStyleCnt="4"/>
+      <dgm:prSet presAssocID="{A89E0B09-4E81-4A5B-9B01-3A2004B8F646}" presName="thickLine" presStyleLbl="alignNode1" presStyleIdx="3" presStyleCnt="5"/>
       <dgm:spPr/>
     </dgm:pt>
     <dgm:pt modelId="{62ADE75B-13D0-47B6-A5D1-F352C9228661}" type="pres">
@@ -3736,7 +3783,7 @@
       <dgm:spPr/>
     </dgm:pt>
     <dgm:pt modelId="{1220EDAF-ABCE-4053-AD03-46476F26D0AF}" type="pres">
-      <dgm:prSet presAssocID="{A89E0B09-4E81-4A5B-9B01-3A2004B8F646}" presName="tx1" presStyleLbl="revTx" presStyleIdx="3" presStyleCnt="7" custScaleX="228674"/>
+      <dgm:prSet presAssocID="{A89E0B09-4E81-4A5B-9B01-3A2004B8F646}" presName="tx1" presStyleLbl="revTx" presStyleIdx="3" presStyleCnt="8" custScaleX="228674"/>
       <dgm:spPr/>
     </dgm:pt>
     <dgm:pt modelId="{BEC215C3-BB58-4DCA-8311-396EAC5E2D39}" type="pres">
@@ -3756,7 +3803,7 @@
       <dgm:spPr/>
     </dgm:pt>
     <dgm:pt modelId="{873D135B-0080-428B-A755-521CFA7E3B8F}" type="pres">
-      <dgm:prSet presAssocID="{6291779B-3AAD-411A-9CD1-576A72E3B510}" presName="tx2" presStyleLbl="revTx" presStyleIdx="4" presStyleCnt="7"/>
+      <dgm:prSet presAssocID="{6291779B-3AAD-411A-9CD1-576A72E3B510}" presName="tx2" presStyleLbl="revTx" presStyleIdx="4" presStyleCnt="8"/>
       <dgm:spPr/>
     </dgm:pt>
     <dgm:pt modelId="{75CBA36D-AB5B-4040-B171-ABF42BF36D94}" type="pres">
@@ -3780,7 +3827,7 @@
       <dgm:spPr/>
     </dgm:pt>
     <dgm:pt modelId="{0344EC9B-E8DC-4E7E-B11A-29089AEC4670}" type="pres">
-      <dgm:prSet presAssocID="{B3A1E980-0B60-4643-96C2-59375286BC4F}" presName="tx2" presStyleLbl="revTx" presStyleIdx="5" presStyleCnt="7"/>
+      <dgm:prSet presAssocID="{B3A1E980-0B60-4643-96C2-59375286BC4F}" presName="tx2" presStyleLbl="revTx" presStyleIdx="5" presStyleCnt="8"/>
       <dgm:spPr/>
     </dgm:pt>
     <dgm:pt modelId="{DCA53E69-D3C3-463D-B7AD-AC87B0E8B2AC}" type="pres">
@@ -3804,7 +3851,7 @@
       <dgm:spPr/>
     </dgm:pt>
     <dgm:pt modelId="{84585BEB-78DD-4032-9400-7BBCE1138B07}" type="pres">
-      <dgm:prSet presAssocID="{A49F805E-DE58-45D0-81D0-913FCF3BE0CB}" presName="tx2" presStyleLbl="revTx" presStyleIdx="6" presStyleCnt="7"/>
+      <dgm:prSet presAssocID="{A49F805E-DE58-45D0-81D0-913FCF3BE0CB}" presName="tx2" presStyleLbl="revTx" presStyleIdx="6" presStyleCnt="8"/>
       <dgm:spPr/>
     </dgm:pt>
     <dgm:pt modelId="{78E1E93C-4AF2-4EE9-9314-DF494C2A18A3}" type="pres">
@@ -3819,11 +3866,28 @@
       <dgm:prSet presAssocID="{A49F805E-DE58-45D0-81D0-913FCF3BE0CB}" presName="vertSpace2b" presStyleCnt="0"/>
       <dgm:spPr/>
     </dgm:pt>
+    <dgm:pt modelId="{4B5DAD89-FB5C-41EB-8AD2-0CA52279852F}" type="pres">
+      <dgm:prSet presAssocID="{919FEB44-10AF-46F9-8C02-167085785719}" presName="thickLine" presStyleLbl="alignNode1" presStyleIdx="4" presStyleCnt="5"/>
+      <dgm:spPr/>
+    </dgm:pt>
+    <dgm:pt modelId="{269E8A6F-36AB-4456-9FCE-80148828769E}" type="pres">
+      <dgm:prSet presAssocID="{919FEB44-10AF-46F9-8C02-167085785719}" presName="horz1" presStyleCnt="0"/>
+      <dgm:spPr/>
+    </dgm:pt>
+    <dgm:pt modelId="{8E7CE4FA-6B76-405D-AD7F-E9C81B580405}" type="pres">
+      <dgm:prSet presAssocID="{919FEB44-10AF-46F9-8C02-167085785719}" presName="tx1" presStyleLbl="revTx" presStyleIdx="7" presStyleCnt="8" custScaleX="164529"/>
+      <dgm:spPr/>
+    </dgm:pt>
+    <dgm:pt modelId="{7C15053A-FF72-45EC-934E-AE5E415768FA}" type="pres">
+      <dgm:prSet presAssocID="{919FEB44-10AF-46F9-8C02-167085785719}" presName="vert1" presStyleCnt="0"/>
+      <dgm:spPr/>
+    </dgm:pt>
   </dgm:ptLst>
   <dgm:cxnLst>
     <dgm:cxn modelId="{439AD80F-1D4D-4056-9534-E6535C11E278}" srcId="{CA5A826B-413C-44B5-8D6E-2BB8AB2324B0}" destId="{5C19D2AE-3585-4F26-8F50-4E0A931E5EAB}" srcOrd="1" destOrd="0" parTransId="{A1A9DCAD-8B30-405B-A37C-968D6E810373}" sibTransId="{40C22F08-04D7-4320-830D-DA495165485B}"/>
     <dgm:cxn modelId="{E4887715-8D90-4611-B60F-0A9058B4575B}" type="presOf" srcId="{5C19D2AE-3585-4F26-8F50-4E0A931E5EAB}" destId="{E67D1EEA-8B46-4F46-BDF8-9E08C6AC7121}" srcOrd="0" destOrd="0" presId="urn:microsoft.com/office/officeart/2008/layout/LinedList"/>
     <dgm:cxn modelId="{B04E1725-3C1A-4D30-9B2B-B77AEB2AF842}" srcId="{A89E0B09-4E81-4A5B-9B01-3A2004B8F646}" destId="{A49F805E-DE58-45D0-81D0-913FCF3BE0CB}" srcOrd="2" destOrd="0" parTransId="{D0EFF268-2292-483A-99C6-CBC13BC854BA}" sibTransId="{2E512183-8DFB-4134-A778-BE5C64354E61}"/>
+    <dgm:cxn modelId="{5593A027-9467-4CB1-BF0B-FBC9FCE2C1A3}" srcId="{CA5A826B-413C-44B5-8D6E-2BB8AB2324B0}" destId="{919FEB44-10AF-46F9-8C02-167085785719}" srcOrd="4" destOrd="0" parTransId="{D4AF8475-50F7-455F-BD44-FAA8D7AEA35F}" sibTransId="{DED11AB6-5569-492C-A843-598041C15D29}"/>
     <dgm:cxn modelId="{B18ECE33-A638-4251-9A5A-2662CB2ECD53}" srcId="{A89E0B09-4E81-4A5B-9B01-3A2004B8F646}" destId="{B3A1E980-0B60-4643-96C2-59375286BC4F}" srcOrd="1" destOrd="0" parTransId="{83B7A37F-3C15-401D-B878-6C7B1CE9244B}" sibTransId="{F3C16E7C-9EAA-4BEB-89A8-C0EB8A732057}"/>
     <dgm:cxn modelId="{3D5E5835-AAB9-4AF0-A996-CC71B98CB319}" type="presOf" srcId="{A1BC36EA-0E65-4019-B8E3-B9E5E06A184E}" destId="{AD3E5496-B533-4428-8A72-132F47829269}" srcOrd="0" destOrd="0" presId="urn:microsoft.com/office/officeart/2008/layout/LinedList"/>
     <dgm:cxn modelId="{61475648-4B73-4F30-A00F-5D7C78CD23EB}" type="presOf" srcId="{A89E0B09-4E81-4A5B-9B01-3A2004B8F646}" destId="{1220EDAF-ABCE-4053-AD03-46476F26D0AF}" srcOrd="0" destOrd="0" presId="urn:microsoft.com/office/officeart/2008/layout/LinedList"/>
@@ -3835,6 +3899,7 @@
     <dgm:cxn modelId="{F3EE24C1-C813-42CB-A532-99C2FA8F198B}" type="presOf" srcId="{A49F805E-DE58-45D0-81D0-913FCF3BE0CB}" destId="{84585BEB-78DD-4032-9400-7BBCE1138B07}" srcOrd="0" destOrd="0" presId="urn:microsoft.com/office/officeart/2008/layout/LinedList"/>
     <dgm:cxn modelId="{9F63EBC3-6948-4900-84A0-8E8C487EA2A4}" srcId="{CA5A826B-413C-44B5-8D6E-2BB8AB2324B0}" destId="{027EB0C5-B406-4BF9-9378-3AEA0ADBA593}" srcOrd="2" destOrd="0" parTransId="{61A1CFC6-C862-4AE8-BB1C-9696C8246C03}" sibTransId="{BC6D4F4E-FFDD-44A7-B2A0-D7976D4FCC02}"/>
     <dgm:cxn modelId="{0479D6C8-D2CF-4828-998D-B496801F9A2F}" type="presOf" srcId="{CA5A826B-413C-44B5-8D6E-2BB8AB2324B0}" destId="{F75BB7CF-56B4-4E6B-9A84-97B053B6AD83}" srcOrd="0" destOrd="0" presId="urn:microsoft.com/office/officeart/2008/layout/LinedList"/>
+    <dgm:cxn modelId="{DCB619F1-F872-44B3-988C-699EAC24AF7E}" type="presOf" srcId="{919FEB44-10AF-46F9-8C02-167085785719}" destId="{8E7CE4FA-6B76-405D-AD7F-E9C81B580405}" srcOrd="0" destOrd="0" presId="urn:microsoft.com/office/officeart/2008/layout/LinedList"/>
     <dgm:cxn modelId="{041F84F1-A827-43AB-9F9F-22848890B5FC}" type="presOf" srcId="{027EB0C5-B406-4BF9-9378-3AEA0ADBA593}" destId="{B33A5476-265F-48D5-9F41-598B6135C36F}" srcOrd="0" destOrd="0" presId="urn:microsoft.com/office/officeart/2008/layout/LinedList"/>
     <dgm:cxn modelId="{02D2C20D-F649-4339-BF6C-FB52BB62C7B9}" type="presParOf" srcId="{F75BB7CF-56B4-4E6B-9A84-97B053B6AD83}" destId="{5A8F6734-E4C6-4721-B34F-5B74471D3836}" srcOrd="0" destOrd="0" presId="urn:microsoft.com/office/officeart/2008/layout/LinedList"/>
     <dgm:cxn modelId="{D06E683C-9E33-4AEC-9E44-32D06B94A133}" type="presParOf" srcId="{F75BB7CF-56B4-4E6B-9A84-97B053B6AD83}" destId="{BA3D851B-5729-4741-A698-C4480994D887}" srcOrd="1" destOrd="0" presId="urn:microsoft.com/office/officeart/2008/layout/LinedList"/>
@@ -3871,6 +3936,10 @@
     <dgm:cxn modelId="{11EBACA5-F246-4FFA-9249-6F1B92BC3B21}" type="presParOf" srcId="{DDC67E98-9BEC-4EE9-B37A-8AEB0C573827}" destId="{78E1E93C-4AF2-4EE9-9314-DF494C2A18A3}" srcOrd="2" destOrd="0" presId="urn:microsoft.com/office/officeart/2008/layout/LinedList"/>
     <dgm:cxn modelId="{6080759D-FEB4-4697-A7A7-0A52A90017AA}" type="presParOf" srcId="{BEC215C3-BB58-4DCA-8311-396EAC5E2D39}" destId="{45CF7D57-62B2-4176-8F25-0FD2AD4B8565}" srcOrd="8" destOrd="0" presId="urn:microsoft.com/office/officeart/2008/layout/LinedList"/>
     <dgm:cxn modelId="{E48ABEAB-62E9-4625-BDC0-C0B3752A7385}" type="presParOf" srcId="{BEC215C3-BB58-4DCA-8311-396EAC5E2D39}" destId="{7F65AE7D-72E6-4AEE-B68A-525D5E912012}" srcOrd="9" destOrd="0" presId="urn:microsoft.com/office/officeart/2008/layout/LinedList"/>
+    <dgm:cxn modelId="{82212742-FD00-4475-83B7-D8EBEB1138D5}" type="presParOf" srcId="{F75BB7CF-56B4-4E6B-9A84-97B053B6AD83}" destId="{4B5DAD89-FB5C-41EB-8AD2-0CA52279852F}" srcOrd="8" destOrd="0" presId="urn:microsoft.com/office/officeart/2008/layout/LinedList"/>
+    <dgm:cxn modelId="{C77D306E-C1C2-4508-9031-25BD07717470}" type="presParOf" srcId="{F75BB7CF-56B4-4E6B-9A84-97B053B6AD83}" destId="{269E8A6F-36AB-4456-9FCE-80148828769E}" srcOrd="9" destOrd="0" presId="urn:microsoft.com/office/officeart/2008/layout/LinedList"/>
+    <dgm:cxn modelId="{28C35F64-1849-4FE4-BCDE-F33FAE0C40FD}" type="presParOf" srcId="{269E8A6F-36AB-4456-9FCE-80148828769E}" destId="{8E7CE4FA-6B76-405D-AD7F-E9C81B580405}" srcOrd="0" destOrd="0" presId="urn:microsoft.com/office/officeart/2008/layout/LinedList"/>
+    <dgm:cxn modelId="{FF224B1B-DE77-4DAD-9610-594DDE54A575}" type="presParOf" srcId="{269E8A6F-36AB-4456-9FCE-80148828769E}" destId="{7C15053A-FF72-45EC-934E-AE5E415768FA}" srcOrd="1" destOrd="0" presId="urn:microsoft.com/office/officeart/2008/layout/LinedList"/>
   </dgm:cxnLst>
   <dgm:bg/>
   <dgm:whole/>
@@ -4223,10 +4292,10 @@
             <a:buNone/>
           </a:pPr>
           <a:r>
-            <a:rPr lang="en-US" sz="1700" b="0" i="0" kern="1200"/>
+            <a:rPr lang="en-US" sz="1700" b="0" i="0" kern="1200" dirty="0"/>
             <a:t>Hash functions play a crucial role in securing passwords. Instead of storing actual passwords, systems store the hash values, adding an extra layer of security.</a:t>
           </a:r>
-          <a:endParaRPr lang="en-US" sz="1700" kern="1200"/>
+          <a:endParaRPr lang="en-US" sz="1700" kern="1200" dirty="0"/>
         </a:p>
       </dsp:txBody>
       <dsp:txXfrm>
@@ -4594,7 +4663,7 @@
       </dsp:nvSpPr>
       <dsp:spPr>
         <a:xfrm>
-          <a:off x="0" y="0"/>
+          <a:off x="0" y="693"/>
           <a:ext cx="6266011" cy="0"/>
         </a:xfrm>
         <a:prstGeom prst="line">
@@ -4666,8 +4735,8 @@
       </dsp:nvSpPr>
       <dsp:spPr>
         <a:xfrm>
-          <a:off x="0" y="0"/>
-          <a:ext cx="2239021" cy="1419848"/>
+          <a:off x="0" y="693"/>
+          <a:ext cx="2239021" cy="1135601"/>
         </a:xfrm>
         <a:prstGeom prst="rect">
           <a:avLst/>
@@ -4715,8 +4784,8 @@
         </a:p>
       </dsp:txBody>
       <dsp:txXfrm>
-        <a:off x="0" y="0"/>
-        <a:ext cx="2239021" cy="1419848"/>
+        <a:off x="0" y="693"/>
+        <a:ext cx="2239021" cy="1135601"/>
       </dsp:txXfrm>
     </dsp:sp>
     <dsp:sp modelId="{5CB61063-B9E0-4A17-98D5-3681FB7CAEE8}">
@@ -4726,7 +4795,7 @@
       </dsp:nvSpPr>
       <dsp:spPr>
         <a:xfrm>
-          <a:off x="0" y="1419848"/>
+          <a:off x="0" y="1136294"/>
           <a:ext cx="6266011" cy="0"/>
         </a:xfrm>
         <a:prstGeom prst="line">
@@ -4736,9 +4805,9 @@
           <a:gsLst>
             <a:gs pos="0">
               <a:schemeClr val="accent2">
-                <a:hueOff val="-236686"/>
-                <a:satOff val="-1956"/>
-                <a:lumOff val="-4183"/>
+                <a:hueOff val="-177515"/>
+                <a:satOff val="-1467"/>
+                <a:lumOff val="-3137"/>
                 <a:alphaOff val="0"/>
                 <a:tint val="96000"/>
                 <a:lumMod val="104000"/>
@@ -4746,9 +4815,9 @@
             </a:gs>
             <a:gs pos="100000">
               <a:schemeClr val="accent2">
-                <a:hueOff val="-236686"/>
-                <a:satOff val="-1956"/>
-                <a:lumOff val="-4183"/>
+                <a:hueOff val="-177515"/>
+                <a:satOff val="-1467"/>
+                <a:lumOff val="-3137"/>
                 <a:alphaOff val="0"/>
                 <a:shade val="90000"/>
                 <a:lumMod val="90000"/>
@@ -4760,9 +4829,9 @@
         <a:ln w="9525" cap="rnd" cmpd="sng" algn="ctr">
           <a:solidFill>
             <a:schemeClr val="accent2">
-              <a:hueOff val="-236686"/>
-              <a:satOff val="-1956"/>
-              <a:lumOff val="-4183"/>
+              <a:hueOff val="-177515"/>
+              <a:satOff val="-1467"/>
+              <a:lumOff val="-3137"/>
               <a:alphaOff val="0"/>
             </a:schemeClr>
           </a:solidFill>
@@ -4798,8 +4867,8 @@
       </dsp:nvSpPr>
       <dsp:spPr>
         <a:xfrm>
-          <a:off x="0" y="1419848"/>
-          <a:ext cx="2239021" cy="1419848"/>
+          <a:off x="0" y="1136294"/>
+          <a:ext cx="2239021" cy="1135601"/>
         </a:xfrm>
         <a:prstGeom prst="rect">
           <a:avLst/>
@@ -4847,8 +4916,8 @@
         </a:p>
       </dsp:txBody>
       <dsp:txXfrm>
-        <a:off x="0" y="1419848"/>
-        <a:ext cx="2239021" cy="1419848"/>
+        <a:off x="0" y="1136294"/>
+        <a:ext cx="2239021" cy="1135601"/>
       </dsp:txXfrm>
     </dsp:sp>
     <dsp:sp modelId="{C50F4BF3-78C5-4EBD-8F1A-862A32842590}">
@@ -4858,7 +4927,7 @@
       </dsp:nvSpPr>
       <dsp:spPr>
         <a:xfrm>
-          <a:off x="0" y="2839696"/>
+          <a:off x="0" y="2271896"/>
           <a:ext cx="6266011" cy="0"/>
         </a:xfrm>
         <a:prstGeom prst="line">
@@ -4868,9 +4937,9 @@
           <a:gsLst>
             <a:gs pos="0">
               <a:schemeClr val="accent2">
-                <a:hueOff val="-473373"/>
-                <a:satOff val="-3912"/>
-                <a:lumOff val="-8366"/>
+                <a:hueOff val="-355029"/>
+                <a:satOff val="-2934"/>
+                <a:lumOff val="-6274"/>
                 <a:alphaOff val="0"/>
                 <a:tint val="96000"/>
                 <a:lumMod val="104000"/>
@@ -4878,9 +4947,9 @@
             </a:gs>
             <a:gs pos="100000">
               <a:schemeClr val="accent2">
-                <a:hueOff val="-473373"/>
-                <a:satOff val="-3912"/>
-                <a:lumOff val="-8366"/>
+                <a:hueOff val="-355029"/>
+                <a:satOff val="-2934"/>
+                <a:lumOff val="-6274"/>
                 <a:alphaOff val="0"/>
                 <a:shade val="90000"/>
                 <a:lumMod val="90000"/>
@@ -4892,9 +4961,9 @@
         <a:ln w="9525" cap="rnd" cmpd="sng" algn="ctr">
           <a:solidFill>
             <a:schemeClr val="accent2">
-              <a:hueOff val="-473373"/>
-              <a:satOff val="-3912"/>
-              <a:lumOff val="-8366"/>
+              <a:hueOff val="-355029"/>
+              <a:satOff val="-2934"/>
+              <a:lumOff val="-6274"/>
               <a:alphaOff val="0"/>
             </a:schemeClr>
           </a:solidFill>
@@ -4930,8 +4999,8 @@
       </dsp:nvSpPr>
       <dsp:spPr>
         <a:xfrm>
-          <a:off x="0" y="2839696"/>
-          <a:ext cx="2239021" cy="1419848"/>
+          <a:off x="0" y="2271896"/>
+          <a:ext cx="2239021" cy="1135601"/>
         </a:xfrm>
         <a:prstGeom prst="rect">
           <a:avLst/>
@@ -4980,8 +5049,8 @@
         </a:p>
       </dsp:txBody>
       <dsp:txXfrm>
-        <a:off x="0" y="2839696"/>
-        <a:ext cx="2239021" cy="1419848"/>
+        <a:off x="0" y="2271896"/>
+        <a:ext cx="2239021" cy="1135601"/>
       </dsp:txXfrm>
     </dsp:sp>
     <dsp:sp modelId="{431F3373-B7D8-4D24-A508-51BBB0666800}">
@@ -4991,7 +5060,463 @@
       </dsp:nvSpPr>
       <dsp:spPr>
         <a:xfrm>
-          <a:off x="0" y="4259545"/>
+          <a:off x="0" y="3407497"/>
+          <a:ext cx="6266011" cy="0"/>
+        </a:xfrm>
+        <a:prstGeom prst="line">
+          <a:avLst/>
+        </a:prstGeom>
+        <a:gradFill rotWithShape="0">
+          <a:gsLst>
+            <a:gs pos="0">
+              <a:schemeClr val="accent2">
+                <a:hueOff val="-532544"/>
+                <a:satOff val="-4401"/>
+                <a:lumOff val="-9412"/>
+                <a:alphaOff val="0"/>
+                <a:tint val="96000"/>
+                <a:lumMod val="104000"/>
+              </a:schemeClr>
+            </a:gs>
+            <a:gs pos="100000">
+              <a:schemeClr val="accent2">
+                <a:hueOff val="-532544"/>
+                <a:satOff val="-4401"/>
+                <a:lumOff val="-9412"/>
+                <a:alphaOff val="0"/>
+                <a:shade val="90000"/>
+                <a:lumMod val="90000"/>
+              </a:schemeClr>
+            </a:gs>
+          </a:gsLst>
+          <a:lin ang="5400000" scaled="0"/>
+        </a:gradFill>
+        <a:ln w="9525" cap="rnd" cmpd="sng" algn="ctr">
+          <a:solidFill>
+            <a:schemeClr val="accent2">
+              <a:hueOff val="-532544"/>
+              <a:satOff val="-4401"/>
+              <a:lumOff val="-9412"/>
+              <a:alphaOff val="0"/>
+            </a:schemeClr>
+          </a:solidFill>
+          <a:prstDash val="solid"/>
+        </a:ln>
+        <a:effectLst>
+          <a:outerShdw blurRad="63500" dist="25400" dir="5400000" rotWithShape="0">
+            <a:srgbClr val="000000">
+              <a:alpha val="60000"/>
+            </a:srgbClr>
+          </a:outerShdw>
+        </a:effectLst>
+      </dsp:spPr>
+      <dsp:style>
+        <a:lnRef idx="1">
+          <a:scrgbClr r="0" g="0" b="0"/>
+        </a:lnRef>
+        <a:fillRef idx="3">
+          <a:scrgbClr r="0" g="0" b="0"/>
+        </a:fillRef>
+        <a:effectRef idx="2">
+          <a:scrgbClr r="0" g="0" b="0"/>
+        </a:effectRef>
+        <a:fontRef idx="minor">
+          <a:schemeClr val="lt1"/>
+        </a:fontRef>
+      </dsp:style>
+    </dsp:sp>
+    <dsp:sp modelId="{1220EDAF-ABCE-4053-AD03-46476F26D0AF}">
+      <dsp:nvSpPr>
+        <dsp:cNvPr id="0" name=""/>
+        <dsp:cNvSpPr/>
+      </dsp:nvSpPr>
+      <dsp:spPr>
+        <a:xfrm>
+          <a:off x="0" y="3407497"/>
+          <a:ext cx="2278045" cy="1135601"/>
+        </a:xfrm>
+        <a:prstGeom prst="rect">
+          <a:avLst/>
+        </a:prstGeom>
+        <a:noFill/>
+        <a:ln>
+          <a:noFill/>
+        </a:ln>
+        <a:effectLst/>
+      </dsp:spPr>
+      <dsp:style>
+        <a:lnRef idx="0">
+          <a:scrgbClr r="0" g="0" b="0"/>
+        </a:lnRef>
+        <a:fillRef idx="0">
+          <a:scrgbClr r="0" g="0" b="0"/>
+        </a:fillRef>
+        <a:effectRef idx="0">
+          <a:scrgbClr r="0" g="0" b="0"/>
+        </a:effectRef>
+        <a:fontRef idx="minor"/>
+      </dsp:style>
+      <dsp:txBody>
+        <a:bodyPr spcFirstLastPara="0" vert="horz" wrap="square" lIns="91440" tIns="91440" rIns="91440" bIns="91440" numCol="1" spcCol="1270" anchor="ctr" anchorCtr="0">
+          <a:noAutofit/>
+        </a:bodyPr>
+        <a:lstStyle/>
+        <a:p>
+          <a:pPr marL="0" lvl="0" indent="0" algn="l" defTabSz="1066800">
+            <a:lnSpc>
+              <a:spcPct val="90000"/>
+            </a:lnSpc>
+            <a:spcBef>
+              <a:spcPct val="0"/>
+            </a:spcBef>
+            <a:spcAft>
+              <a:spcPct val="35000"/>
+            </a:spcAft>
+            <a:buNone/>
+          </a:pPr>
+          <a:r>
+            <a:rPr lang="en-US" sz="2400" kern="1200" dirty="0"/>
+            <a:t>(Secure Hash Algorithm) SHA Family:</a:t>
+          </a:r>
+        </a:p>
+      </dsp:txBody>
+      <dsp:txXfrm>
+        <a:off x="0" y="3407497"/>
+        <a:ext cx="2278045" cy="1135601"/>
+      </dsp:txXfrm>
+    </dsp:sp>
+    <dsp:sp modelId="{873D135B-0080-428B-A755-521CFA7E3B8F}">
+      <dsp:nvSpPr>
+        <dsp:cNvPr id="0" name=""/>
+        <dsp:cNvSpPr/>
+      </dsp:nvSpPr>
+      <dsp:spPr>
+        <a:xfrm>
+          <a:off x="2352760" y="3425241"/>
+          <a:ext cx="3910076" cy="354875"/>
+        </a:xfrm>
+        <a:prstGeom prst="rect">
+          <a:avLst/>
+        </a:prstGeom>
+        <a:noFill/>
+        <a:ln>
+          <a:noFill/>
+        </a:ln>
+        <a:effectLst/>
+      </dsp:spPr>
+      <dsp:style>
+        <a:lnRef idx="0">
+          <a:scrgbClr r="0" g="0" b="0"/>
+        </a:lnRef>
+        <a:fillRef idx="0">
+          <a:scrgbClr r="0" g="0" b="0"/>
+        </a:fillRef>
+        <a:effectRef idx="0">
+          <a:scrgbClr r="0" g="0" b="0"/>
+        </a:effectRef>
+        <a:fontRef idx="minor"/>
+      </dsp:style>
+      <dsp:txBody>
+        <a:bodyPr spcFirstLastPara="0" vert="horz" wrap="square" lIns="91440" tIns="91440" rIns="91440" bIns="91440" numCol="1" spcCol="1270" anchor="t" anchorCtr="0">
+          <a:noAutofit/>
+        </a:bodyPr>
+        <a:lstStyle/>
+        <a:p>
+          <a:pPr marL="0" lvl="0" indent="0" algn="l" defTabSz="1066800">
+            <a:lnSpc>
+              <a:spcPct val="90000"/>
+            </a:lnSpc>
+            <a:spcBef>
+              <a:spcPct val="0"/>
+            </a:spcBef>
+            <a:spcAft>
+              <a:spcPct val="35000"/>
+            </a:spcAft>
+            <a:buNone/>
+          </a:pPr>
+          <a:r>
+            <a:rPr lang="en-US" sz="2400" kern="1200" dirty="0"/>
+            <a:t>SHA-256</a:t>
+          </a:r>
+        </a:p>
+      </dsp:txBody>
+      <dsp:txXfrm>
+        <a:off x="2352760" y="3425241"/>
+        <a:ext cx="3910076" cy="354875"/>
+      </dsp:txXfrm>
+    </dsp:sp>
+    <dsp:sp modelId="{905BE06E-09D8-48B0-A97A-37F263E58D9E}">
+      <dsp:nvSpPr>
+        <dsp:cNvPr id="0" name=""/>
+        <dsp:cNvSpPr/>
+      </dsp:nvSpPr>
+      <dsp:spPr>
+        <a:xfrm>
+          <a:off x="2278045" y="3780116"/>
+          <a:ext cx="3984791" cy="0"/>
+        </a:xfrm>
+        <a:prstGeom prst="line">
+          <a:avLst/>
+        </a:prstGeom>
+        <a:solidFill>
+          <a:schemeClr val="accent2">
+            <a:hueOff val="0"/>
+            <a:satOff val="0"/>
+            <a:lumOff val="0"/>
+            <a:alphaOff val="0"/>
+          </a:schemeClr>
+        </a:solidFill>
+        <a:ln w="15875" cap="rnd" cmpd="sng" algn="ctr">
+          <a:solidFill>
+            <a:schemeClr val="accent2">
+              <a:tint val="50000"/>
+              <a:hueOff val="0"/>
+              <a:satOff val="0"/>
+              <a:lumOff val="0"/>
+              <a:alphaOff val="0"/>
+            </a:schemeClr>
+          </a:solidFill>
+          <a:prstDash val="solid"/>
+        </a:ln>
+        <a:effectLst/>
+      </dsp:spPr>
+      <dsp:style>
+        <a:lnRef idx="2">
+          <a:scrgbClr r="0" g="0" b="0"/>
+        </a:lnRef>
+        <a:fillRef idx="1">
+          <a:scrgbClr r="0" g="0" b="0"/>
+        </a:fillRef>
+        <a:effectRef idx="1">
+          <a:scrgbClr r="0" g="0" b="0"/>
+        </a:effectRef>
+        <a:fontRef idx="minor"/>
+      </dsp:style>
+    </dsp:sp>
+    <dsp:sp modelId="{0344EC9B-E8DC-4E7E-B11A-29089AEC4670}">
+      <dsp:nvSpPr>
+        <dsp:cNvPr id="0" name=""/>
+        <dsp:cNvSpPr/>
+      </dsp:nvSpPr>
+      <dsp:spPr>
+        <a:xfrm>
+          <a:off x="2352760" y="3797860"/>
+          <a:ext cx="3910076" cy="354875"/>
+        </a:xfrm>
+        <a:prstGeom prst="rect">
+          <a:avLst/>
+        </a:prstGeom>
+        <a:noFill/>
+        <a:ln>
+          <a:noFill/>
+        </a:ln>
+        <a:effectLst/>
+      </dsp:spPr>
+      <dsp:style>
+        <a:lnRef idx="0">
+          <a:scrgbClr r="0" g="0" b="0"/>
+        </a:lnRef>
+        <a:fillRef idx="0">
+          <a:scrgbClr r="0" g="0" b="0"/>
+        </a:fillRef>
+        <a:effectRef idx="0">
+          <a:scrgbClr r="0" g="0" b="0"/>
+        </a:effectRef>
+        <a:fontRef idx="minor"/>
+      </dsp:style>
+      <dsp:txBody>
+        <a:bodyPr spcFirstLastPara="0" vert="horz" wrap="square" lIns="91440" tIns="91440" rIns="91440" bIns="91440" numCol="1" spcCol="1270" anchor="t" anchorCtr="0">
+          <a:noAutofit/>
+        </a:bodyPr>
+        <a:lstStyle/>
+        <a:p>
+          <a:pPr marL="0" lvl="0" indent="0" algn="l" defTabSz="1066800">
+            <a:lnSpc>
+              <a:spcPct val="90000"/>
+            </a:lnSpc>
+            <a:spcBef>
+              <a:spcPct val="0"/>
+            </a:spcBef>
+            <a:spcAft>
+              <a:spcPct val="35000"/>
+            </a:spcAft>
+            <a:buNone/>
+          </a:pPr>
+          <a:r>
+            <a:rPr lang="en-US" sz="2400" kern="1200"/>
+            <a:t>SHA-1</a:t>
+          </a:r>
+        </a:p>
+      </dsp:txBody>
+      <dsp:txXfrm>
+        <a:off x="2352760" y="3797860"/>
+        <a:ext cx="3910076" cy="354875"/>
+      </dsp:txXfrm>
+    </dsp:sp>
+    <dsp:sp modelId="{EB9B9734-DD60-491E-9EDF-1A1768C7FFE1}">
+      <dsp:nvSpPr>
+        <dsp:cNvPr id="0" name=""/>
+        <dsp:cNvSpPr/>
+      </dsp:nvSpPr>
+      <dsp:spPr>
+        <a:xfrm>
+          <a:off x="2278045" y="4152736"/>
+          <a:ext cx="3984791" cy="0"/>
+        </a:xfrm>
+        <a:prstGeom prst="line">
+          <a:avLst/>
+        </a:prstGeom>
+        <a:solidFill>
+          <a:schemeClr val="accent2">
+            <a:hueOff val="0"/>
+            <a:satOff val="0"/>
+            <a:lumOff val="0"/>
+            <a:alphaOff val="0"/>
+          </a:schemeClr>
+        </a:solidFill>
+        <a:ln w="15875" cap="rnd" cmpd="sng" algn="ctr">
+          <a:solidFill>
+            <a:schemeClr val="accent2">
+              <a:tint val="50000"/>
+              <a:hueOff val="0"/>
+              <a:satOff val="0"/>
+              <a:lumOff val="0"/>
+              <a:alphaOff val="0"/>
+            </a:schemeClr>
+          </a:solidFill>
+          <a:prstDash val="solid"/>
+        </a:ln>
+        <a:effectLst/>
+      </dsp:spPr>
+      <dsp:style>
+        <a:lnRef idx="2">
+          <a:scrgbClr r="0" g="0" b="0"/>
+        </a:lnRef>
+        <a:fillRef idx="1">
+          <a:scrgbClr r="0" g="0" b="0"/>
+        </a:fillRef>
+        <a:effectRef idx="1">
+          <a:scrgbClr r="0" g="0" b="0"/>
+        </a:effectRef>
+        <a:fontRef idx="minor"/>
+      </dsp:style>
+    </dsp:sp>
+    <dsp:sp modelId="{84585BEB-78DD-4032-9400-7BBCE1138B07}">
+      <dsp:nvSpPr>
+        <dsp:cNvPr id="0" name=""/>
+        <dsp:cNvSpPr/>
+      </dsp:nvSpPr>
+      <dsp:spPr>
+        <a:xfrm>
+          <a:off x="2352760" y="4170479"/>
+          <a:ext cx="3910076" cy="354875"/>
+        </a:xfrm>
+        <a:prstGeom prst="rect">
+          <a:avLst/>
+        </a:prstGeom>
+        <a:noFill/>
+        <a:ln>
+          <a:noFill/>
+        </a:ln>
+        <a:effectLst/>
+      </dsp:spPr>
+      <dsp:style>
+        <a:lnRef idx="0">
+          <a:scrgbClr r="0" g="0" b="0"/>
+        </a:lnRef>
+        <a:fillRef idx="0">
+          <a:scrgbClr r="0" g="0" b="0"/>
+        </a:fillRef>
+        <a:effectRef idx="0">
+          <a:scrgbClr r="0" g="0" b="0"/>
+        </a:effectRef>
+        <a:fontRef idx="minor"/>
+      </dsp:style>
+      <dsp:txBody>
+        <a:bodyPr spcFirstLastPara="0" vert="horz" wrap="square" lIns="91440" tIns="91440" rIns="91440" bIns="91440" numCol="1" spcCol="1270" anchor="t" anchorCtr="0">
+          <a:noAutofit/>
+        </a:bodyPr>
+        <a:lstStyle/>
+        <a:p>
+          <a:pPr marL="0" lvl="0" indent="0" algn="l" defTabSz="1066800">
+            <a:lnSpc>
+              <a:spcPct val="90000"/>
+            </a:lnSpc>
+            <a:spcBef>
+              <a:spcPct val="0"/>
+            </a:spcBef>
+            <a:spcAft>
+              <a:spcPct val="35000"/>
+            </a:spcAft>
+            <a:buNone/>
+          </a:pPr>
+          <a:r>
+            <a:rPr lang="en-US" sz="2400" kern="1200" dirty="0"/>
+            <a:t>SHA-3</a:t>
+          </a:r>
+        </a:p>
+      </dsp:txBody>
+      <dsp:txXfrm>
+        <a:off x="2352760" y="4170479"/>
+        <a:ext cx="3910076" cy="354875"/>
+      </dsp:txXfrm>
+    </dsp:sp>
+    <dsp:sp modelId="{45CF7D57-62B2-4176-8F25-0FD2AD4B8565}">
+      <dsp:nvSpPr>
+        <dsp:cNvPr id="0" name=""/>
+        <dsp:cNvSpPr/>
+      </dsp:nvSpPr>
+      <dsp:spPr>
+        <a:xfrm>
+          <a:off x="2278045" y="4525355"/>
+          <a:ext cx="3984791" cy="0"/>
+        </a:xfrm>
+        <a:prstGeom prst="line">
+          <a:avLst/>
+        </a:prstGeom>
+        <a:solidFill>
+          <a:schemeClr val="accent2">
+            <a:hueOff val="0"/>
+            <a:satOff val="0"/>
+            <a:lumOff val="0"/>
+            <a:alphaOff val="0"/>
+          </a:schemeClr>
+        </a:solidFill>
+        <a:ln w="15875" cap="rnd" cmpd="sng" algn="ctr">
+          <a:solidFill>
+            <a:schemeClr val="accent2">
+              <a:tint val="50000"/>
+              <a:hueOff val="0"/>
+              <a:satOff val="0"/>
+              <a:lumOff val="0"/>
+              <a:alphaOff val="0"/>
+            </a:schemeClr>
+          </a:solidFill>
+          <a:prstDash val="solid"/>
+        </a:ln>
+        <a:effectLst/>
+      </dsp:spPr>
+      <dsp:style>
+        <a:lnRef idx="2">
+          <a:scrgbClr r="0" g="0" b="0"/>
+        </a:lnRef>
+        <a:fillRef idx="1">
+          <a:scrgbClr r="0" g="0" b="0"/>
+        </a:fillRef>
+        <a:effectRef idx="1">
+          <a:scrgbClr r="0" g="0" b="0"/>
+        </a:effectRef>
+        <a:fontRef idx="minor"/>
+      </dsp:style>
+    </dsp:sp>
+    <dsp:sp modelId="{4B5DAD89-FB5C-41EB-8AD2-0CA52279852F}">
+      <dsp:nvSpPr>
+        <dsp:cNvPr id="0" name=""/>
+        <dsp:cNvSpPr/>
+      </dsp:nvSpPr>
+      <dsp:spPr>
+        <a:xfrm>
+          <a:off x="0" y="4543099"/>
           <a:ext cx="6266011" cy="0"/>
         </a:xfrm>
         <a:prstGeom prst="line">
@@ -5056,15 +5581,15 @@
         </a:fontRef>
       </dsp:style>
     </dsp:sp>
-    <dsp:sp modelId="{1220EDAF-ABCE-4053-AD03-46476F26D0AF}">
+    <dsp:sp modelId="{8E7CE4FA-6B76-405D-AD7F-E9C81B580405}">
       <dsp:nvSpPr>
         <dsp:cNvPr id="0" name=""/>
         <dsp:cNvSpPr/>
       </dsp:nvSpPr>
       <dsp:spPr>
         <a:xfrm>
-          <a:off x="0" y="4259545"/>
-          <a:ext cx="2278045" cy="1419848"/>
+          <a:off x="0" y="4543099"/>
+          <a:ext cx="2061881" cy="1135601"/>
         </a:xfrm>
         <a:prstGeom prst="rect">
           <a:avLst/>
@@ -5088,12 +5613,12 @@
         <a:fontRef idx="minor"/>
       </dsp:style>
       <dsp:txBody>
-        <a:bodyPr spcFirstLastPara="0" vert="horz" wrap="square" lIns="91440" tIns="91440" rIns="91440" bIns="91440" numCol="1" spcCol="1270" anchor="ctr" anchorCtr="0">
+        <a:bodyPr spcFirstLastPara="0" vert="horz" wrap="square" lIns="106680" tIns="106680" rIns="106680" bIns="106680" numCol="1" spcCol="1270" anchor="ctr" anchorCtr="0">
           <a:noAutofit/>
         </a:bodyPr>
         <a:lstStyle/>
         <a:p>
-          <a:pPr marL="0" lvl="0" indent="0" algn="l" defTabSz="1066800">
+          <a:pPr marL="0" lvl="0" indent="0" algn="l" defTabSz="1244600">
             <a:lnSpc>
               <a:spcPct val="90000"/>
             </a:lnSpc>
@@ -5106,339 +5631,15 @@
             <a:buNone/>
           </a:pPr>
           <a:r>
-            <a:rPr lang="en-US" sz="2400" kern="1200" dirty="0"/>
-            <a:t>(Secure Hash Algorithm) SHA Family:</a:t>
+            <a:rPr lang="en-US" sz="2800" kern="1200" dirty="0"/>
+            <a:t>Tiger</a:t>
           </a:r>
         </a:p>
       </dsp:txBody>
       <dsp:txXfrm>
-        <a:off x="0" y="4259545"/>
-        <a:ext cx="2278045" cy="1419848"/>
+        <a:off x="0" y="4543099"/>
+        <a:ext cx="2061881" cy="1135601"/>
       </dsp:txXfrm>
-    </dsp:sp>
-    <dsp:sp modelId="{873D135B-0080-428B-A755-521CFA7E3B8F}">
-      <dsp:nvSpPr>
-        <dsp:cNvPr id="0" name=""/>
-        <dsp:cNvSpPr/>
-      </dsp:nvSpPr>
-      <dsp:spPr>
-        <a:xfrm>
-          <a:off x="2352760" y="4281730"/>
-          <a:ext cx="3910076" cy="443702"/>
-        </a:xfrm>
-        <a:prstGeom prst="rect">
-          <a:avLst/>
-        </a:prstGeom>
-        <a:noFill/>
-        <a:ln>
-          <a:noFill/>
-        </a:ln>
-        <a:effectLst/>
-      </dsp:spPr>
-      <dsp:style>
-        <a:lnRef idx="0">
-          <a:scrgbClr r="0" g="0" b="0"/>
-        </a:lnRef>
-        <a:fillRef idx="0">
-          <a:scrgbClr r="0" g="0" b="0"/>
-        </a:fillRef>
-        <a:effectRef idx="0">
-          <a:scrgbClr r="0" g="0" b="0"/>
-        </a:effectRef>
-        <a:fontRef idx="minor"/>
-      </dsp:style>
-      <dsp:txBody>
-        <a:bodyPr spcFirstLastPara="0" vert="horz" wrap="square" lIns="91440" tIns="91440" rIns="91440" bIns="91440" numCol="1" spcCol="1270" anchor="t" anchorCtr="0">
-          <a:noAutofit/>
-        </a:bodyPr>
-        <a:lstStyle/>
-        <a:p>
-          <a:pPr marL="0" lvl="0" indent="0" algn="l" defTabSz="1066800">
-            <a:lnSpc>
-              <a:spcPct val="90000"/>
-            </a:lnSpc>
-            <a:spcBef>
-              <a:spcPct val="0"/>
-            </a:spcBef>
-            <a:spcAft>
-              <a:spcPct val="35000"/>
-            </a:spcAft>
-            <a:buNone/>
-          </a:pPr>
-          <a:r>
-            <a:rPr lang="en-US" sz="2400" kern="1200" dirty="0"/>
-            <a:t>SHA-256</a:t>
-          </a:r>
-        </a:p>
-      </dsp:txBody>
-      <dsp:txXfrm>
-        <a:off x="2352760" y="4281730"/>
-        <a:ext cx="3910076" cy="443702"/>
-      </dsp:txXfrm>
-    </dsp:sp>
-    <dsp:sp modelId="{905BE06E-09D8-48B0-A97A-37F263E58D9E}">
-      <dsp:nvSpPr>
-        <dsp:cNvPr id="0" name=""/>
-        <dsp:cNvSpPr/>
-      </dsp:nvSpPr>
-      <dsp:spPr>
-        <a:xfrm>
-          <a:off x="2278045" y="4725433"/>
-          <a:ext cx="3984791" cy="0"/>
-        </a:xfrm>
-        <a:prstGeom prst="line">
-          <a:avLst/>
-        </a:prstGeom>
-        <a:solidFill>
-          <a:schemeClr val="accent2">
-            <a:hueOff val="0"/>
-            <a:satOff val="0"/>
-            <a:lumOff val="0"/>
-            <a:alphaOff val="0"/>
-          </a:schemeClr>
-        </a:solidFill>
-        <a:ln w="15875" cap="rnd" cmpd="sng" algn="ctr">
-          <a:solidFill>
-            <a:schemeClr val="accent2">
-              <a:tint val="50000"/>
-              <a:hueOff val="0"/>
-              <a:satOff val="0"/>
-              <a:lumOff val="0"/>
-              <a:alphaOff val="0"/>
-            </a:schemeClr>
-          </a:solidFill>
-          <a:prstDash val="solid"/>
-        </a:ln>
-        <a:effectLst/>
-      </dsp:spPr>
-      <dsp:style>
-        <a:lnRef idx="2">
-          <a:scrgbClr r="0" g="0" b="0"/>
-        </a:lnRef>
-        <a:fillRef idx="1">
-          <a:scrgbClr r="0" g="0" b="0"/>
-        </a:fillRef>
-        <a:effectRef idx="1">
-          <a:scrgbClr r="0" g="0" b="0"/>
-        </a:effectRef>
-        <a:fontRef idx="minor"/>
-      </dsp:style>
-    </dsp:sp>
-    <dsp:sp modelId="{0344EC9B-E8DC-4E7E-B11A-29089AEC4670}">
-      <dsp:nvSpPr>
-        <dsp:cNvPr id="0" name=""/>
-        <dsp:cNvSpPr/>
-      </dsp:nvSpPr>
-      <dsp:spPr>
-        <a:xfrm>
-          <a:off x="2352760" y="4747618"/>
-          <a:ext cx="3910076" cy="443702"/>
-        </a:xfrm>
-        <a:prstGeom prst="rect">
-          <a:avLst/>
-        </a:prstGeom>
-        <a:noFill/>
-        <a:ln>
-          <a:noFill/>
-        </a:ln>
-        <a:effectLst/>
-      </dsp:spPr>
-      <dsp:style>
-        <a:lnRef idx="0">
-          <a:scrgbClr r="0" g="0" b="0"/>
-        </a:lnRef>
-        <a:fillRef idx="0">
-          <a:scrgbClr r="0" g="0" b="0"/>
-        </a:fillRef>
-        <a:effectRef idx="0">
-          <a:scrgbClr r="0" g="0" b="0"/>
-        </a:effectRef>
-        <a:fontRef idx="minor"/>
-      </dsp:style>
-      <dsp:txBody>
-        <a:bodyPr spcFirstLastPara="0" vert="horz" wrap="square" lIns="91440" tIns="91440" rIns="91440" bIns="91440" numCol="1" spcCol="1270" anchor="t" anchorCtr="0">
-          <a:noAutofit/>
-        </a:bodyPr>
-        <a:lstStyle/>
-        <a:p>
-          <a:pPr marL="0" lvl="0" indent="0" algn="l" defTabSz="1066800">
-            <a:lnSpc>
-              <a:spcPct val="90000"/>
-            </a:lnSpc>
-            <a:spcBef>
-              <a:spcPct val="0"/>
-            </a:spcBef>
-            <a:spcAft>
-              <a:spcPct val="35000"/>
-            </a:spcAft>
-            <a:buNone/>
-          </a:pPr>
-          <a:r>
-            <a:rPr lang="en-US" sz="2400" kern="1200"/>
-            <a:t>SHA-1</a:t>
-          </a:r>
-        </a:p>
-      </dsp:txBody>
-      <dsp:txXfrm>
-        <a:off x="2352760" y="4747618"/>
-        <a:ext cx="3910076" cy="443702"/>
-      </dsp:txXfrm>
-    </dsp:sp>
-    <dsp:sp modelId="{EB9B9734-DD60-491E-9EDF-1A1768C7FFE1}">
-      <dsp:nvSpPr>
-        <dsp:cNvPr id="0" name=""/>
-        <dsp:cNvSpPr/>
-      </dsp:nvSpPr>
-      <dsp:spPr>
-        <a:xfrm>
-          <a:off x="2278045" y="5191321"/>
-          <a:ext cx="3984791" cy="0"/>
-        </a:xfrm>
-        <a:prstGeom prst="line">
-          <a:avLst/>
-        </a:prstGeom>
-        <a:solidFill>
-          <a:schemeClr val="accent2">
-            <a:hueOff val="0"/>
-            <a:satOff val="0"/>
-            <a:lumOff val="0"/>
-            <a:alphaOff val="0"/>
-          </a:schemeClr>
-        </a:solidFill>
-        <a:ln w="15875" cap="rnd" cmpd="sng" algn="ctr">
-          <a:solidFill>
-            <a:schemeClr val="accent2">
-              <a:tint val="50000"/>
-              <a:hueOff val="0"/>
-              <a:satOff val="0"/>
-              <a:lumOff val="0"/>
-              <a:alphaOff val="0"/>
-            </a:schemeClr>
-          </a:solidFill>
-          <a:prstDash val="solid"/>
-        </a:ln>
-        <a:effectLst/>
-      </dsp:spPr>
-      <dsp:style>
-        <a:lnRef idx="2">
-          <a:scrgbClr r="0" g="0" b="0"/>
-        </a:lnRef>
-        <a:fillRef idx="1">
-          <a:scrgbClr r="0" g="0" b="0"/>
-        </a:fillRef>
-        <a:effectRef idx="1">
-          <a:scrgbClr r="0" g="0" b="0"/>
-        </a:effectRef>
-        <a:fontRef idx="minor"/>
-      </dsp:style>
-    </dsp:sp>
-    <dsp:sp modelId="{84585BEB-78DD-4032-9400-7BBCE1138B07}">
-      <dsp:nvSpPr>
-        <dsp:cNvPr id="0" name=""/>
-        <dsp:cNvSpPr/>
-      </dsp:nvSpPr>
-      <dsp:spPr>
-        <a:xfrm>
-          <a:off x="2352760" y="5213506"/>
-          <a:ext cx="3910076" cy="443702"/>
-        </a:xfrm>
-        <a:prstGeom prst="rect">
-          <a:avLst/>
-        </a:prstGeom>
-        <a:noFill/>
-        <a:ln>
-          <a:noFill/>
-        </a:ln>
-        <a:effectLst/>
-      </dsp:spPr>
-      <dsp:style>
-        <a:lnRef idx="0">
-          <a:scrgbClr r="0" g="0" b="0"/>
-        </a:lnRef>
-        <a:fillRef idx="0">
-          <a:scrgbClr r="0" g="0" b="0"/>
-        </a:fillRef>
-        <a:effectRef idx="0">
-          <a:scrgbClr r="0" g="0" b="0"/>
-        </a:effectRef>
-        <a:fontRef idx="minor"/>
-      </dsp:style>
-      <dsp:txBody>
-        <a:bodyPr spcFirstLastPara="0" vert="horz" wrap="square" lIns="91440" tIns="91440" rIns="91440" bIns="91440" numCol="1" spcCol="1270" anchor="t" anchorCtr="0">
-          <a:noAutofit/>
-        </a:bodyPr>
-        <a:lstStyle/>
-        <a:p>
-          <a:pPr marL="0" lvl="0" indent="0" algn="l" defTabSz="1066800">
-            <a:lnSpc>
-              <a:spcPct val="90000"/>
-            </a:lnSpc>
-            <a:spcBef>
-              <a:spcPct val="0"/>
-            </a:spcBef>
-            <a:spcAft>
-              <a:spcPct val="35000"/>
-            </a:spcAft>
-            <a:buNone/>
-          </a:pPr>
-          <a:r>
-            <a:rPr lang="en-US" sz="2400" kern="1200"/>
-            <a:t>SHA-3</a:t>
-          </a:r>
-        </a:p>
-      </dsp:txBody>
-      <dsp:txXfrm>
-        <a:off x="2352760" y="5213506"/>
-        <a:ext cx="3910076" cy="443702"/>
-      </dsp:txXfrm>
-    </dsp:sp>
-    <dsp:sp modelId="{45CF7D57-62B2-4176-8F25-0FD2AD4B8565}">
-      <dsp:nvSpPr>
-        <dsp:cNvPr id="0" name=""/>
-        <dsp:cNvSpPr/>
-      </dsp:nvSpPr>
-      <dsp:spPr>
-        <a:xfrm>
-          <a:off x="2278045" y="5657208"/>
-          <a:ext cx="3984791" cy="0"/>
-        </a:xfrm>
-        <a:prstGeom prst="line">
-          <a:avLst/>
-        </a:prstGeom>
-        <a:solidFill>
-          <a:schemeClr val="accent2">
-            <a:hueOff val="0"/>
-            <a:satOff val="0"/>
-            <a:lumOff val="0"/>
-            <a:alphaOff val="0"/>
-          </a:schemeClr>
-        </a:solidFill>
-        <a:ln w="15875" cap="rnd" cmpd="sng" algn="ctr">
-          <a:solidFill>
-            <a:schemeClr val="accent2">
-              <a:tint val="50000"/>
-              <a:hueOff val="0"/>
-              <a:satOff val="0"/>
-              <a:lumOff val="0"/>
-              <a:alphaOff val="0"/>
-            </a:schemeClr>
-          </a:solidFill>
-          <a:prstDash val="solid"/>
-        </a:ln>
-        <a:effectLst/>
-      </dsp:spPr>
-      <dsp:style>
-        <a:lnRef idx="2">
-          <a:scrgbClr r="0" g="0" b="0"/>
-        </a:lnRef>
-        <a:fillRef idx="1">
-          <a:scrgbClr r="0" g="0" b="0"/>
-        </a:fillRef>
-        <a:effectRef idx="1">
-          <a:scrgbClr r="0" g="0" b="0"/>
-        </a:effectRef>
-        <a:fontRef idx="minor"/>
-      </dsp:style>
     </dsp:sp>
   </dsp:spTree>
 </dsp:drawing>
@@ -16246,10 +16447,18 @@
         </p:nvSpPr>
         <p:spPr/>
         <p:txBody>
-          <a:bodyPr/>
+          <a:bodyPr anchor="ctr">
+            <a:normAutofit/>
+          </a:bodyPr>
           <a:lstStyle/>
           <a:p>
-            <a:endParaRPr lang="en-US"/>
+            <a:pPr marL="36900" indent="0">
+              <a:buNone/>
+            </a:pPr>
+            <a:r>
+              <a:rPr lang="en-US" sz="2400" dirty="0"/>
+              <a:t>Argon2 is a key derivation function (KDF) and password hashing algorithm that was selected as the winner of the Password Hashing Competition (PHC) in 2015. It is designed to securely hash passwords and other sensitive information, making it difficult for attackers to reverse-engineer the original input from the hash value. Argon2 is known for its resistance against various cryptographic attacks, including brute-force and time-memory trade-off attacks. It is considered to be highly secure and is widely used for securely storing passwords and protecting sensitive data in software applications.</a:t>
+            </a:r>
           </a:p>
         </p:txBody>
       </p:sp>
@@ -16288,6 +16497,544 @@
           <p:cNvPr id="2" name="Title 1">
             <a:extLst>
               <a:ext uri="{FF2B5EF4-FFF2-40B4-BE49-F238E27FC236}">
+                <a16:creationId xmlns:a16="http://schemas.microsoft.com/office/drawing/2014/main" id="{B70F12F5-DC0A-1126-318B-4DCDCEE6C24F}"/>
+              </a:ext>
+            </a:extLst>
+          </p:cNvPr>
+          <p:cNvSpPr>
+            <a:spLocks noGrp="1"/>
+          </p:cNvSpPr>
+          <p:nvPr>
+            <p:ph type="title"/>
+          </p:nvPr>
+        </p:nvSpPr>
+        <p:spPr/>
+        <p:txBody>
+          <a:bodyPr/>
+          <a:lstStyle/>
+          <a:p>
+            <a:r>
+              <a:rPr lang="en-US" dirty="0"/>
+              <a:t>How does argon2 work ?</a:t>
+            </a:r>
+          </a:p>
+        </p:txBody>
+      </p:sp>
+      <p:sp>
+        <p:nvSpPr>
+          <p:cNvPr id="3" name="Content Placeholder 2">
+            <a:extLst>
+              <a:ext uri="{FF2B5EF4-FFF2-40B4-BE49-F238E27FC236}">
+                <a16:creationId xmlns:a16="http://schemas.microsoft.com/office/drawing/2014/main" id="{8A896973-A62E-4F20-6160-2890D64B2A63}"/>
+              </a:ext>
+            </a:extLst>
+          </p:cNvPr>
+          <p:cNvSpPr>
+            <a:spLocks noGrp="1"/>
+          </p:cNvSpPr>
+          <p:nvPr>
+            <p:ph idx="1"/>
+          </p:nvPr>
+        </p:nvSpPr>
+        <p:spPr>
+          <a:xfrm>
+            <a:off x="913795" y="1732449"/>
+            <a:ext cx="10353762" cy="4515951"/>
+          </a:xfrm>
+        </p:spPr>
+        <p:txBody>
+          <a:bodyPr anchor="ctr">
+            <a:normAutofit/>
+          </a:bodyPr>
+          <a:lstStyle/>
+          <a:p>
+            <a:pPr marL="494100" indent="-457200">
+              <a:buFont typeface="+mj-lt"/>
+              <a:buAutoNum type="arabicPeriod"/>
+            </a:pPr>
+            <a:r>
+              <a:rPr lang="en-US" sz="2400" b="1" dirty="0"/>
+              <a:t>Initialization</a:t>
+            </a:r>
+            <a:r>
+              <a:rPr lang="en-US" sz="2400" dirty="0"/>
+              <a:t>: Argon2 takes several parameters as input, salt and so on. These parameters influence how much memory and time the algorithm will consume.</a:t>
+            </a:r>
+          </a:p>
+          <a:p>
+            <a:pPr marL="494100" indent="-457200">
+              <a:buFont typeface="+mj-lt"/>
+              <a:buAutoNum type="arabicPeriod"/>
+            </a:pPr>
+            <a:r>
+              <a:rPr lang="en-US" sz="2400" b="1" dirty="0"/>
+              <a:t>Memory-Hardness</a:t>
+            </a:r>
+            <a:r>
+              <a:rPr lang="en-US" sz="2400" dirty="0"/>
+              <a:t>: Argon2 uses a large, configurable amount of memory. </a:t>
+            </a:r>
+          </a:p>
+          <a:p>
+            <a:pPr marL="494100" indent="-457200">
+              <a:buFont typeface="+mj-lt"/>
+              <a:buAutoNum type="arabicPeriod"/>
+            </a:pPr>
+            <a:r>
+              <a:rPr lang="en-US" sz="2400" b="1" dirty="0"/>
+              <a:t>Data-Dependent Operations</a:t>
+            </a:r>
+            <a:r>
+              <a:rPr lang="en-US" sz="2400" dirty="0"/>
+              <a:t>: Argon2 operates on the input data (password and salt) , meaning the operations performed depend on the actual data being processed. </a:t>
+            </a:r>
+          </a:p>
+          <a:p>
+            <a:pPr marL="494100" indent="-457200">
+              <a:buFont typeface="+mj-lt"/>
+              <a:buAutoNum type="arabicPeriod"/>
+            </a:pPr>
+            <a:r>
+              <a:rPr lang="en-US" sz="2400" b="1" dirty="0"/>
+              <a:t>Parallel Processing</a:t>
+            </a:r>
+            <a:r>
+              <a:rPr lang="en-US" sz="2400" dirty="0"/>
+              <a:t>: Argon2 can be parallelized efficiently. The parallelism factor parameter controls how many threads can be used to hash the password.</a:t>
+            </a:r>
+          </a:p>
+        </p:txBody>
+      </p:sp>
+    </p:spTree>
+    <p:extLst>
+      <p:ext uri="{BB962C8B-B14F-4D97-AF65-F5344CB8AC3E}">
+        <p14:creationId xmlns:p14="http://schemas.microsoft.com/office/powerpoint/2010/main" val="3532762655"/>
+      </p:ext>
+    </p:extLst>
+  </p:cSld>
+  <p:clrMapOvr>
+    <a:masterClrMapping/>
+  </p:clrMapOvr>
+</p:sld>
+</file>
+
+<file path=ppt/slides/slide13.xml><?xml version="1.0" encoding="utf-8"?>
+<p:sld xmlns:a="http://schemas.openxmlformats.org/drawingml/2006/main" xmlns:r="http://schemas.openxmlformats.org/officeDocument/2006/relationships" xmlns:p="http://schemas.openxmlformats.org/presentationml/2006/main">
+  <p:cSld>
+    <p:spTree>
+      <p:nvGrpSpPr>
+        <p:cNvPr id="1" name=""/>
+        <p:cNvGrpSpPr/>
+        <p:nvPr/>
+      </p:nvGrpSpPr>
+      <p:grpSpPr>
+        <a:xfrm>
+          <a:off x="0" y="0"/>
+          <a:ext cx="0" cy="0"/>
+          <a:chOff x="0" y="0"/>
+          <a:chExt cx="0" cy="0"/>
+        </a:xfrm>
+      </p:grpSpPr>
+      <p:sp>
+        <p:nvSpPr>
+          <p:cNvPr id="3" name="Content Placeholder 2">
+            <a:extLst>
+              <a:ext uri="{FF2B5EF4-FFF2-40B4-BE49-F238E27FC236}">
+                <a16:creationId xmlns:a16="http://schemas.microsoft.com/office/drawing/2014/main" id="{E664C39D-01FB-79E4-B4DF-69AB06D72700}"/>
+              </a:ext>
+            </a:extLst>
+          </p:cNvPr>
+          <p:cNvSpPr>
+            <a:spLocks noGrp="1"/>
+          </p:cNvSpPr>
+          <p:nvPr>
+            <p:ph idx="1"/>
+          </p:nvPr>
+        </p:nvSpPr>
+        <p:spPr>
+          <a:xfrm>
+            <a:off x="919119" y="574431"/>
+            <a:ext cx="10353762" cy="5709138"/>
+          </a:xfrm>
+        </p:spPr>
+        <p:txBody>
+          <a:bodyPr anchor="ctr">
+            <a:normAutofit/>
+          </a:bodyPr>
+          <a:lstStyle/>
+          <a:p>
+            <a:pPr marL="494100" indent="-457200">
+              <a:buFont typeface="+mj-lt"/>
+              <a:buAutoNum type="arabicPeriod" startAt="5"/>
+            </a:pPr>
+            <a:r>
+              <a:rPr lang="en-US" sz="2400" b="1" dirty="0"/>
+              <a:t>Iterations</a:t>
+            </a:r>
+            <a:r>
+              <a:rPr lang="en-US" sz="2400" dirty="0"/>
+              <a:t>: Argon2 applies a specified number of iterations to the data. This makes the hash calculation intentionally slow, which is a desirable feature for password hashing algorithms.</a:t>
+            </a:r>
+            <a:endParaRPr lang="en-US" sz="2400" b="1" dirty="0"/>
+          </a:p>
+          <a:p>
+            <a:pPr marL="494100" indent="-457200">
+              <a:buFont typeface="+mj-lt"/>
+              <a:buAutoNum type="arabicPeriod" startAt="5"/>
+            </a:pPr>
+            <a:r>
+              <a:rPr lang="en-US" sz="2400" b="1" dirty="0"/>
+              <a:t>Finalization</a:t>
+            </a:r>
+            <a:r>
+              <a:rPr lang="en-US" sz="2400" dirty="0"/>
+              <a:t>: After the specified number of iterations, Argon2 produces the final hash value. This hash value can be stored in a database for later authentication purposes.</a:t>
+            </a:r>
+          </a:p>
+        </p:txBody>
+      </p:sp>
+    </p:spTree>
+    <p:extLst>
+      <p:ext uri="{BB962C8B-B14F-4D97-AF65-F5344CB8AC3E}">
+        <p14:creationId xmlns:p14="http://schemas.microsoft.com/office/powerpoint/2010/main" val="2491487529"/>
+      </p:ext>
+    </p:extLst>
+  </p:cSld>
+  <p:clrMapOvr>
+    <a:masterClrMapping/>
+  </p:clrMapOvr>
+</p:sld>
+</file>
+
+<file path=ppt/slides/slide14.xml><?xml version="1.0" encoding="utf-8"?>
+<p:sld xmlns:a="http://schemas.openxmlformats.org/drawingml/2006/main" xmlns:r="http://schemas.openxmlformats.org/officeDocument/2006/relationships" xmlns:p="http://schemas.openxmlformats.org/presentationml/2006/main">
+  <p:cSld>
+    <p:spTree>
+      <p:nvGrpSpPr>
+        <p:cNvPr id="1" name=""/>
+        <p:cNvGrpSpPr/>
+        <p:nvPr/>
+      </p:nvGrpSpPr>
+      <p:grpSpPr>
+        <a:xfrm>
+          <a:off x="0" y="0"/>
+          <a:ext cx="0" cy="0"/>
+          <a:chOff x="0" y="0"/>
+          <a:chExt cx="0" cy="0"/>
+        </a:xfrm>
+      </p:grpSpPr>
+      <p:sp>
+        <p:nvSpPr>
+          <p:cNvPr id="3" name="Content Placeholder 2">
+            <a:extLst>
+              <a:ext uri="{FF2B5EF4-FFF2-40B4-BE49-F238E27FC236}">
+                <a16:creationId xmlns:a16="http://schemas.microsoft.com/office/drawing/2014/main" id="{E8F99121-C975-835D-3DC6-8522B0E76E09}"/>
+              </a:ext>
+            </a:extLst>
+          </p:cNvPr>
+          <p:cNvSpPr>
+            <a:spLocks noGrp="1"/>
+          </p:cNvSpPr>
+          <p:nvPr>
+            <p:ph idx="1"/>
+          </p:nvPr>
+        </p:nvSpPr>
+        <p:spPr>
+          <a:xfrm>
+            <a:off x="919119" y="586154"/>
+            <a:ext cx="10353762" cy="5685691"/>
+          </a:xfrm>
+        </p:spPr>
+        <p:txBody>
+          <a:bodyPr/>
+          <a:lstStyle/>
+          <a:p>
+            <a:pPr marL="36900" indent="0">
+              <a:buNone/>
+            </a:pPr>
+            <a:r>
+              <a:rPr lang="en-US" sz="2800" dirty="0"/>
+              <a:t>All three modes allow specification by three parameters that control:</a:t>
+            </a:r>
+          </a:p>
+          <a:p>
+            <a:pPr marL="36900" indent="0">
+              <a:buNone/>
+            </a:pPr>
+            <a:endParaRPr lang="en-US" sz="1800" dirty="0"/>
+          </a:p>
+          <a:p>
+            <a:pPr marL="36900" indent="0">
+              <a:buNone/>
+            </a:pPr>
+            <a:r>
+              <a:rPr lang="en-US" sz="2400" dirty="0"/>
+              <a:t>1. execution time 		2. memory required 		3. degree of parallelism</a:t>
+            </a:r>
+          </a:p>
+          <a:p>
+            <a:pPr marL="36900" indent="0">
+              <a:buNone/>
+            </a:pPr>
+            <a:endParaRPr lang="en-US" sz="2800" dirty="0"/>
+          </a:p>
+          <a:p>
+            <a:pPr marL="36900" indent="0">
+              <a:buNone/>
+            </a:pPr>
+            <a:endParaRPr lang="en-US" sz="2800" dirty="0"/>
+          </a:p>
+          <a:p>
+            <a:pPr marL="36900" indent="0">
+              <a:buNone/>
+            </a:pPr>
+            <a:r>
+              <a:rPr lang="en-US" sz="2800" dirty="0"/>
+              <a:t>Using with:</a:t>
+            </a:r>
+          </a:p>
+          <a:p>
+            <a:pPr marL="36900" indent="0">
+              <a:buNone/>
+            </a:pPr>
+            <a:endParaRPr lang="en-US" sz="1800" dirty="0"/>
+          </a:p>
+          <a:p>
+            <a:pPr marL="151200" indent="0">
+              <a:lnSpc>
+                <a:spcPct val="115000"/>
+              </a:lnSpc>
+              <a:buNone/>
+            </a:pPr>
+            <a:r>
+              <a:rPr lang="en-US" sz="2400" kern="100" dirty="0">
+                <a:effectLst/>
+                <a:latin typeface="Calisto MT (Body)"/>
+                <a:ea typeface="Calibri" panose="020F0502020204030204" pitchFamily="34" charset="0"/>
+                <a:cs typeface="Arial" panose="020B0604020202020204" pitchFamily="34" charset="0"/>
+              </a:rPr>
+              <a:t>1. PHP 							2. Nodejs							3. </a:t>
+            </a:r>
+            <a:r>
+              <a:rPr lang="en-US" sz="2400" kern="100" dirty="0" err="1">
+                <a:effectLst/>
+                <a:latin typeface="Calisto MT (Body)"/>
+                <a:ea typeface="Calibri" panose="020F0502020204030204" pitchFamily="34" charset="0"/>
+                <a:cs typeface="Arial" panose="020B0604020202020204" pitchFamily="34" charset="0"/>
+              </a:rPr>
+              <a:t>Js</a:t>
+            </a:r>
+            <a:endParaRPr lang="en-US" sz="2400" kern="100" dirty="0">
+              <a:effectLst/>
+              <a:latin typeface="Calisto MT (Body)"/>
+              <a:ea typeface="Calibri" panose="020F0502020204030204" pitchFamily="34" charset="0"/>
+              <a:cs typeface="Arial" panose="020B0604020202020204" pitchFamily="34" charset="0"/>
+            </a:endParaRPr>
+          </a:p>
+        </p:txBody>
+      </p:sp>
+    </p:spTree>
+    <p:extLst>
+      <p:ext uri="{BB962C8B-B14F-4D97-AF65-F5344CB8AC3E}">
+        <p14:creationId xmlns:p14="http://schemas.microsoft.com/office/powerpoint/2010/main" val="1289891613"/>
+      </p:ext>
+    </p:extLst>
+  </p:cSld>
+  <p:clrMapOvr>
+    <a:masterClrMapping/>
+  </p:clrMapOvr>
+</p:sld>
+</file>
+
+<file path=ppt/slides/slide15.xml><?xml version="1.0" encoding="utf-8"?>
+<p:sld xmlns:a="http://schemas.openxmlformats.org/drawingml/2006/main" xmlns:r="http://schemas.openxmlformats.org/officeDocument/2006/relationships" xmlns:p="http://schemas.openxmlformats.org/presentationml/2006/main">
+  <p:cSld>
+    <p:spTree>
+      <p:nvGrpSpPr>
+        <p:cNvPr id="1" name=""/>
+        <p:cNvGrpSpPr/>
+        <p:nvPr/>
+      </p:nvGrpSpPr>
+      <p:grpSpPr>
+        <a:xfrm>
+          <a:off x="0" y="0"/>
+          <a:ext cx="0" cy="0"/>
+          <a:chOff x="0" y="0"/>
+          <a:chExt cx="0" cy="0"/>
+        </a:xfrm>
+      </p:grpSpPr>
+      <p:sp>
+        <p:nvSpPr>
+          <p:cNvPr id="2" name="Title 1">
+            <a:extLst>
+              <a:ext uri="{FF2B5EF4-FFF2-40B4-BE49-F238E27FC236}">
+                <a16:creationId xmlns:a16="http://schemas.microsoft.com/office/drawing/2014/main" id="{D660DF77-D297-7443-743F-109FC658CAC2}"/>
+              </a:ext>
+            </a:extLst>
+          </p:cNvPr>
+          <p:cNvSpPr>
+            <a:spLocks noGrp="1"/>
+          </p:cNvSpPr>
+          <p:nvPr>
+            <p:ph type="title"/>
+          </p:nvPr>
+        </p:nvSpPr>
+        <p:spPr/>
+        <p:txBody>
+          <a:bodyPr/>
+          <a:lstStyle/>
+          <a:p>
+            <a:r>
+              <a:rPr lang="en-US" dirty="0"/>
+              <a:t>Main parameter to argon2</a:t>
+            </a:r>
+          </a:p>
+        </p:txBody>
+      </p:sp>
+      <p:sp>
+        <p:nvSpPr>
+          <p:cNvPr id="3" name="Content Placeholder 2">
+            <a:extLst>
+              <a:ext uri="{FF2B5EF4-FFF2-40B4-BE49-F238E27FC236}">
+                <a16:creationId xmlns:a16="http://schemas.microsoft.com/office/drawing/2014/main" id="{8E2B99B0-21BE-568C-D506-4E6D7E8394D1}"/>
+              </a:ext>
+            </a:extLst>
+          </p:cNvPr>
+          <p:cNvSpPr>
+            <a:spLocks noGrp="1"/>
+          </p:cNvSpPr>
+          <p:nvPr>
+            <p:ph idx="1"/>
+          </p:nvPr>
+        </p:nvSpPr>
+        <p:spPr/>
+        <p:txBody>
+          <a:bodyPr anchor="ctr">
+            <a:normAutofit/>
+          </a:bodyPr>
+          <a:lstStyle/>
+          <a:p>
+            <a:pPr marL="36900" indent="0">
+              <a:buNone/>
+            </a:pPr>
+            <a:r>
+              <a:rPr lang="en-US" sz="2300" dirty="0"/>
+              <a:t>1.	</a:t>
+            </a:r>
+            <a:r>
+              <a:rPr lang="en-US" sz="2300" b="1" dirty="0"/>
+              <a:t>Password</a:t>
+            </a:r>
+            <a:r>
+              <a:rPr lang="en-US" sz="2300" dirty="0"/>
+              <a:t>: The input password to be hashed.</a:t>
+            </a:r>
+          </a:p>
+          <a:p>
+            <a:pPr marL="36900" indent="0">
+              <a:buNone/>
+            </a:pPr>
+            <a:r>
+              <a:rPr lang="en-US" sz="2300" dirty="0"/>
+              <a:t>2.	</a:t>
+            </a:r>
+            <a:r>
+              <a:rPr lang="en-US" sz="2300" b="1" dirty="0"/>
+              <a:t>Salt</a:t>
+            </a:r>
+            <a:r>
+              <a:rPr lang="en-US" sz="2300" dirty="0"/>
+              <a:t>: A random value used to increase the security of the hash.</a:t>
+            </a:r>
+          </a:p>
+          <a:p>
+            <a:pPr marL="36900" indent="0">
+              <a:buNone/>
+            </a:pPr>
+            <a:r>
+              <a:rPr lang="en-US" sz="2300" dirty="0"/>
+              <a:t>3.	</a:t>
+            </a:r>
+            <a:r>
+              <a:rPr lang="en-US" sz="2300" b="1" dirty="0"/>
+              <a:t>Memory Cost</a:t>
+            </a:r>
+            <a:r>
+              <a:rPr lang="en-US" sz="2300" dirty="0"/>
+              <a:t>: The amount of memory (in kilobytes) that the algorithm uses.</a:t>
+            </a:r>
+          </a:p>
+          <a:p>
+            <a:pPr marL="36900" indent="0">
+              <a:buNone/>
+            </a:pPr>
+            <a:r>
+              <a:rPr lang="en-US" sz="2300" dirty="0"/>
+              <a:t>4.	</a:t>
+            </a:r>
+            <a:r>
+              <a:rPr lang="en-US" sz="2300" b="1" dirty="0"/>
+              <a:t>Time Cost</a:t>
+            </a:r>
+            <a:r>
+              <a:rPr lang="en-US" sz="2300" dirty="0"/>
+              <a:t>: The number of iterations the algorithm performs.</a:t>
+            </a:r>
+          </a:p>
+          <a:p>
+            <a:pPr marL="36900" indent="0">
+              <a:buNone/>
+            </a:pPr>
+            <a:r>
+              <a:rPr lang="en-US" sz="2300" dirty="0"/>
+              <a:t>5.	</a:t>
+            </a:r>
+            <a:r>
+              <a:rPr lang="en-US" sz="2300" b="1" dirty="0"/>
+              <a:t>Parallelism Factor</a:t>
+            </a:r>
+            <a:r>
+              <a:rPr lang="en-US" sz="2300" dirty="0"/>
+              <a:t>: The number of parallel threads or lanes used for computation.</a:t>
+            </a:r>
+          </a:p>
+        </p:txBody>
+      </p:sp>
+    </p:spTree>
+    <p:extLst>
+      <p:ext uri="{BB962C8B-B14F-4D97-AF65-F5344CB8AC3E}">
+        <p14:creationId xmlns:p14="http://schemas.microsoft.com/office/powerpoint/2010/main" val="1700185692"/>
+      </p:ext>
+    </p:extLst>
+  </p:cSld>
+  <p:clrMapOvr>
+    <a:masterClrMapping/>
+  </p:clrMapOvr>
+</p:sld>
+</file>
+
+<file path=ppt/slides/slide16.xml><?xml version="1.0" encoding="utf-8"?>
+<p:sld xmlns:a="http://schemas.openxmlformats.org/drawingml/2006/main" xmlns:r="http://schemas.openxmlformats.org/officeDocument/2006/relationships" xmlns:p="http://schemas.openxmlformats.org/presentationml/2006/main">
+  <p:cSld>
+    <p:spTree>
+      <p:nvGrpSpPr>
+        <p:cNvPr id="1" name=""/>
+        <p:cNvGrpSpPr/>
+        <p:nvPr/>
+      </p:nvGrpSpPr>
+      <p:grpSpPr>
+        <a:xfrm>
+          <a:off x="0" y="0"/>
+          <a:ext cx="0" cy="0"/>
+          <a:chOff x="0" y="0"/>
+          <a:chExt cx="0" cy="0"/>
+        </a:xfrm>
+      </p:grpSpPr>
+      <p:sp>
+        <p:nvSpPr>
+          <p:cNvPr id="2" name="Title 1">
+            <a:extLst>
+              <a:ext uri="{FF2B5EF4-FFF2-40B4-BE49-F238E27FC236}">
                 <a16:creationId xmlns:a16="http://schemas.microsoft.com/office/drawing/2014/main" id="{513C127F-6531-2BB4-29D8-87244A1A9932}"/>
               </a:ext>
             </a:extLst>
@@ -16330,10 +17077,174 @@
         </p:nvSpPr>
         <p:spPr/>
         <p:txBody>
-          <a:bodyPr/>
+          <a:bodyPr anchor="ctr">
+            <a:normAutofit/>
+          </a:bodyPr>
           <a:lstStyle/>
           <a:p>
-            <a:endParaRPr lang="en-US"/>
+            <a:pPr marL="36900" indent="0">
+              <a:buNone/>
+            </a:pPr>
+            <a:r>
+              <a:rPr lang="en-US" sz="2200" dirty="0" err="1">
+                <a:solidFill>
+                  <a:schemeClr val="tx1"/>
+                </a:solidFill>
+                <a:effectLst/>
+                <a:latin typeface="Calisto MT (Body)"/>
+                <a:ea typeface="Times New Roman" panose="02020603050405020304" pitchFamily="18" charset="0"/>
+                <a:cs typeface="Times New Roman" panose="02020603050405020304" pitchFamily="18" charset="0"/>
+              </a:rPr>
+              <a:t>Bcrypt</a:t>
+            </a:r>
+            <a:r>
+              <a:rPr lang="en-US" sz="2200" dirty="0">
+                <a:solidFill>
+                  <a:schemeClr val="tx1"/>
+                </a:solidFill>
+                <a:effectLst/>
+                <a:latin typeface="Calisto MT (Body)"/>
+                <a:ea typeface="Times New Roman" panose="02020603050405020304" pitchFamily="18" charset="0"/>
+                <a:cs typeface="Times New Roman" panose="02020603050405020304" pitchFamily="18" charset="0"/>
+              </a:rPr>
+              <a:t> is a password hashing algorithm designed by Niels Provos and David </a:t>
+            </a:r>
+            <a:r>
+              <a:rPr lang="en-US" sz="2200" dirty="0" err="1">
+                <a:solidFill>
+                  <a:schemeClr val="tx1"/>
+                </a:solidFill>
+                <a:effectLst/>
+                <a:latin typeface="Calisto MT (Body)"/>
+                <a:ea typeface="Times New Roman" panose="02020603050405020304" pitchFamily="18" charset="0"/>
+                <a:cs typeface="Times New Roman" panose="02020603050405020304" pitchFamily="18" charset="0"/>
+              </a:rPr>
+              <a:t>Mazières</a:t>
+            </a:r>
+            <a:r>
+              <a:rPr lang="en-US" sz="2200" dirty="0">
+                <a:solidFill>
+                  <a:schemeClr val="tx1"/>
+                </a:solidFill>
+                <a:effectLst/>
+                <a:latin typeface="Calisto MT (Body)"/>
+                <a:ea typeface="Times New Roman" panose="02020603050405020304" pitchFamily="18" charset="0"/>
+                <a:cs typeface="Times New Roman" panose="02020603050405020304" pitchFamily="18" charset="0"/>
+              </a:rPr>
+              <a:t> based on the Blowfish cipher. The name “</a:t>
+            </a:r>
+            <a:r>
+              <a:rPr lang="en-US" sz="2200" dirty="0" err="1">
+                <a:solidFill>
+                  <a:schemeClr val="tx1"/>
+                </a:solidFill>
+                <a:effectLst/>
+                <a:latin typeface="Calisto MT (Body)"/>
+                <a:ea typeface="Times New Roman" panose="02020603050405020304" pitchFamily="18" charset="0"/>
+                <a:cs typeface="Times New Roman" panose="02020603050405020304" pitchFamily="18" charset="0"/>
+              </a:rPr>
+              <a:t>bcrypt</a:t>
+            </a:r>
+            <a:r>
+              <a:rPr lang="en-US" sz="2200" dirty="0">
+                <a:solidFill>
+                  <a:schemeClr val="tx1"/>
+                </a:solidFill>
+                <a:effectLst/>
+                <a:latin typeface="Calisto MT (Body)"/>
+                <a:ea typeface="Times New Roman" panose="02020603050405020304" pitchFamily="18" charset="0"/>
+                <a:cs typeface="Times New Roman" panose="02020603050405020304" pitchFamily="18" charset="0"/>
+              </a:rPr>
+              <a:t>” is made of two parts: b and crypt, where b stands for Blowfish and crypt is the name of the hashing function used by the Unix password system.</a:t>
+            </a:r>
+          </a:p>
+          <a:p>
+            <a:endParaRPr lang="en-US" sz="2200" dirty="0">
+              <a:solidFill>
+                <a:schemeClr val="tx1"/>
+              </a:solidFill>
+              <a:effectLst/>
+              <a:latin typeface="Calisto MT (Body)"/>
+              <a:ea typeface="Times New Roman" panose="02020603050405020304" pitchFamily="18" charset="0"/>
+              <a:cs typeface="Times New Roman" panose="02020603050405020304" pitchFamily="18" charset="0"/>
+            </a:endParaRPr>
+          </a:p>
+          <a:p>
+            <a:pPr marL="36900" indent="0">
+              <a:buNone/>
+            </a:pPr>
+            <a:r>
+              <a:rPr lang="en-US" sz="2200" dirty="0" err="1">
+                <a:solidFill>
+                  <a:schemeClr val="tx1"/>
+                </a:solidFill>
+                <a:effectLst/>
+                <a:latin typeface="Calisto MT (Body)"/>
+                <a:ea typeface="Times New Roman" panose="02020603050405020304" pitchFamily="18" charset="0"/>
+                <a:cs typeface="Times New Roman" panose="02020603050405020304" pitchFamily="18" charset="0"/>
+              </a:rPr>
+              <a:t>Bcrypt</a:t>
+            </a:r>
+            <a:r>
+              <a:rPr lang="en-US" sz="2200" dirty="0">
+                <a:solidFill>
+                  <a:schemeClr val="tx1"/>
+                </a:solidFill>
+                <a:effectLst/>
+                <a:latin typeface="Calisto MT (Body)"/>
+                <a:ea typeface="Times New Roman" panose="02020603050405020304" pitchFamily="18" charset="0"/>
+                <a:cs typeface="Times New Roman" panose="02020603050405020304" pitchFamily="18" charset="0"/>
+              </a:rPr>
+              <a:t> was created as a result of the failure of Crypt to adapt to technology and hardware advancement. </a:t>
+            </a:r>
+            <a:r>
+              <a:rPr lang="en-US" sz="2200" dirty="0" err="1">
+                <a:solidFill>
+                  <a:schemeClr val="tx1"/>
+                </a:solidFill>
+                <a:effectLst/>
+                <a:latin typeface="Calisto MT (Body)"/>
+                <a:ea typeface="Times New Roman" panose="02020603050405020304" pitchFamily="18" charset="0"/>
+                <a:cs typeface="Times New Roman" panose="02020603050405020304" pitchFamily="18" charset="0"/>
+              </a:rPr>
+              <a:t>Bcrypt</a:t>
+            </a:r>
+            <a:r>
+              <a:rPr lang="en-US" sz="2200" dirty="0">
+                <a:solidFill>
+                  <a:schemeClr val="tx1"/>
+                </a:solidFill>
+                <a:effectLst/>
+                <a:latin typeface="Calisto MT (Body)"/>
+                <a:ea typeface="Times New Roman" panose="02020603050405020304" pitchFamily="18" charset="0"/>
+                <a:cs typeface="Times New Roman" panose="02020603050405020304" pitchFamily="18" charset="0"/>
+              </a:rPr>
+              <a:t> is designed to be a slow algorithm, which is a good thing when it comes to password hashing. Therefore, </a:t>
+            </a:r>
+            <a:r>
+              <a:rPr lang="en-US" sz="2200" dirty="0" err="1">
+                <a:solidFill>
+                  <a:schemeClr val="tx1"/>
+                </a:solidFill>
+                <a:effectLst/>
+                <a:latin typeface="Calisto MT (Body)"/>
+                <a:ea typeface="Times New Roman" panose="02020603050405020304" pitchFamily="18" charset="0"/>
+                <a:cs typeface="Times New Roman" panose="02020603050405020304" pitchFamily="18" charset="0"/>
+              </a:rPr>
+              <a:t>bcrypt</a:t>
+            </a:r>
+            <a:r>
+              <a:rPr lang="en-US" sz="2200" dirty="0">
+                <a:solidFill>
+                  <a:schemeClr val="tx1"/>
+                </a:solidFill>
+                <a:effectLst/>
+                <a:latin typeface="Calisto MT (Body)"/>
+                <a:ea typeface="Times New Roman" panose="02020603050405020304" pitchFamily="18" charset="0"/>
+                <a:cs typeface="Times New Roman" panose="02020603050405020304" pitchFamily="18" charset="0"/>
+              </a:rPr>
+              <a:t> is perfect for password hashing because it reduces brute-force attacks.</a:t>
+            </a:r>
           </a:p>
         </p:txBody>
       </p:sp>
@@ -16350,7 +17261,496 @@
 </p:sld>
 </file>
 
-<file path=ppt/slides/slide13.xml><?xml version="1.0" encoding="utf-8"?>
+<file path=ppt/slides/slide17.xml><?xml version="1.0" encoding="utf-8"?>
+<p:sld xmlns:a="http://schemas.openxmlformats.org/drawingml/2006/main" xmlns:r="http://schemas.openxmlformats.org/officeDocument/2006/relationships" xmlns:p="http://schemas.openxmlformats.org/presentationml/2006/main">
+  <p:cSld>
+    <p:spTree>
+      <p:nvGrpSpPr>
+        <p:cNvPr id="1" name=""/>
+        <p:cNvGrpSpPr/>
+        <p:nvPr/>
+      </p:nvGrpSpPr>
+      <p:grpSpPr>
+        <a:xfrm>
+          <a:off x="0" y="0"/>
+          <a:ext cx="0" cy="0"/>
+          <a:chOff x="0" y="0"/>
+          <a:chExt cx="0" cy="0"/>
+        </a:xfrm>
+      </p:grpSpPr>
+      <p:sp>
+        <p:nvSpPr>
+          <p:cNvPr id="2" name="Title 1">
+            <a:extLst>
+              <a:ext uri="{FF2B5EF4-FFF2-40B4-BE49-F238E27FC236}">
+                <a16:creationId xmlns:a16="http://schemas.microsoft.com/office/drawing/2014/main" id="{C3905C88-00E2-46BF-F9D1-B9CB14F4460F}"/>
+              </a:ext>
+            </a:extLst>
+          </p:cNvPr>
+          <p:cNvSpPr>
+            <a:spLocks noGrp="1"/>
+          </p:cNvSpPr>
+          <p:nvPr>
+            <p:ph type="title"/>
+          </p:nvPr>
+        </p:nvSpPr>
+        <p:spPr/>
+        <p:txBody>
+          <a:bodyPr/>
+          <a:lstStyle/>
+          <a:p>
+            <a:r>
+              <a:rPr lang="en-US" dirty="0"/>
+              <a:t>How does </a:t>
+            </a:r>
+            <a:r>
+              <a:rPr lang="en-US" dirty="0" err="1"/>
+              <a:t>bcrypt</a:t>
+            </a:r>
+            <a:r>
+              <a:rPr lang="en-US" dirty="0"/>
+              <a:t> work?</a:t>
+            </a:r>
+          </a:p>
+        </p:txBody>
+      </p:sp>
+      <p:sp>
+        <p:nvSpPr>
+          <p:cNvPr id="3" name="Content Placeholder 2">
+            <a:extLst>
+              <a:ext uri="{FF2B5EF4-FFF2-40B4-BE49-F238E27FC236}">
+                <a16:creationId xmlns:a16="http://schemas.microsoft.com/office/drawing/2014/main" id="{7F9E0143-268D-5885-5883-D3C749A11CC5}"/>
+              </a:ext>
+            </a:extLst>
+          </p:cNvPr>
+          <p:cNvSpPr>
+            <a:spLocks noGrp="1"/>
+          </p:cNvSpPr>
+          <p:nvPr>
+            <p:ph idx="1"/>
+          </p:nvPr>
+        </p:nvSpPr>
+        <p:spPr>
+          <a:xfrm>
+            <a:off x="913795" y="1732449"/>
+            <a:ext cx="10353762" cy="4515951"/>
+          </a:xfrm>
+        </p:spPr>
+        <p:txBody>
+          <a:bodyPr anchor="ctr">
+            <a:normAutofit/>
+          </a:bodyPr>
+          <a:lstStyle/>
+          <a:p>
+            <a:r>
+              <a:rPr lang="en-US" sz="2400" dirty="0" err="1"/>
+              <a:t>bcrypt</a:t>
+            </a:r>
+            <a:r>
+              <a:rPr lang="en-US" sz="2400" dirty="0"/>
+              <a:t> takes a user-submitted plain password and converts it into a hash. The hash is what is stored in the database. This prevents attackers from accessing users’ plain passwords in the event of a data breach. Unlike some other password-hashing algorithms that just hash the plain password, </a:t>
+            </a:r>
+            <a:r>
+              <a:rPr lang="en-US" sz="2400" dirty="0" err="1"/>
+              <a:t>bcrypt</a:t>
+            </a:r>
+            <a:r>
+              <a:rPr lang="en-US" sz="2400" dirty="0"/>
+              <a:t> uses the concept of salt.</a:t>
+            </a:r>
+          </a:p>
+          <a:p>
+            <a:r>
+              <a:rPr lang="en-US" sz="2400" dirty="0"/>
+              <a:t>This unique randomly generated string provides an additional level of security for a generated hash. Before the plain password is hashed, a salt is generated. Then, it is appended to the plain password, and everything is hashed (the plain password and salt). This help protects against rainbow table attacks because attackers can randomly guess users’ passwords, but they can’t guess the salt.</a:t>
+            </a:r>
+          </a:p>
+        </p:txBody>
+      </p:sp>
+    </p:spTree>
+    <p:extLst>
+      <p:ext uri="{BB962C8B-B14F-4D97-AF65-F5344CB8AC3E}">
+        <p14:creationId xmlns:p14="http://schemas.microsoft.com/office/powerpoint/2010/main" val="3835103005"/>
+      </p:ext>
+    </p:extLst>
+  </p:cSld>
+  <p:clrMapOvr>
+    <a:masterClrMapping/>
+  </p:clrMapOvr>
+</p:sld>
+</file>
+
+<file path=ppt/slides/slide18.xml><?xml version="1.0" encoding="utf-8"?>
+<p:sld xmlns:a="http://schemas.openxmlformats.org/drawingml/2006/main" xmlns:r="http://schemas.openxmlformats.org/officeDocument/2006/relationships" xmlns:p="http://schemas.openxmlformats.org/presentationml/2006/main">
+  <p:cSld>
+    <p:spTree>
+      <p:nvGrpSpPr>
+        <p:cNvPr id="1" name=""/>
+        <p:cNvGrpSpPr/>
+        <p:nvPr/>
+      </p:nvGrpSpPr>
+      <p:grpSpPr>
+        <a:xfrm>
+          <a:off x="0" y="0"/>
+          <a:ext cx="0" cy="0"/>
+          <a:chOff x="0" y="0"/>
+          <a:chExt cx="0" cy="0"/>
+        </a:xfrm>
+      </p:grpSpPr>
+      <p:sp>
+        <p:nvSpPr>
+          <p:cNvPr id="3" name="Content Placeholder 2">
+            <a:extLst>
+              <a:ext uri="{FF2B5EF4-FFF2-40B4-BE49-F238E27FC236}">
+                <a16:creationId xmlns:a16="http://schemas.microsoft.com/office/drawing/2014/main" id="{CC36125B-8B97-B16B-6A4A-19EEA31A0459}"/>
+              </a:ext>
+            </a:extLst>
+          </p:cNvPr>
+          <p:cNvSpPr>
+            <a:spLocks noGrp="1"/>
+          </p:cNvSpPr>
+          <p:nvPr>
+            <p:ph idx="1"/>
+          </p:nvPr>
+        </p:nvSpPr>
+        <p:spPr>
+          <a:xfrm>
+            <a:off x="913560" y="759069"/>
+            <a:ext cx="10364880" cy="5339862"/>
+          </a:xfrm>
+        </p:spPr>
+        <p:txBody>
+          <a:bodyPr anchor="ctr">
+            <a:normAutofit/>
+          </a:bodyPr>
+          <a:lstStyle/>
+          <a:p>
+            <a:r>
+              <a:rPr lang="en-US" sz="2400" dirty="0" err="1"/>
+              <a:t>Bcrypt</a:t>
+            </a:r>
+            <a:r>
+              <a:rPr lang="en-US" sz="2400" dirty="0"/>
+              <a:t> also uses a cost factor (or work factor) to determine how long it takes to generate a hash. This cost factor can be increased to make it slower as hardware power increases. The higher the cost factor, the more secure the hash and the slower the process. Therefore, you need to find the right balance between security and speed.</a:t>
+            </a:r>
+          </a:p>
+          <a:p>
+            <a:pPr marL="36900" indent="0">
+              <a:buNone/>
+            </a:pPr>
+            <a:endParaRPr lang="en-US" sz="2400" dirty="0"/>
+          </a:p>
+          <a:p>
+            <a:r>
+              <a:rPr lang="en-US" sz="2400" dirty="0"/>
+              <a:t>The generated hash will include the salt and other things, like the hash algorithm identifier prefix, the cost factor, and the hash. The hashing process is irreversible. The hash cannot be converted back to the original plain password. Therefore, to determine whether a user provides the correct password, the provided password is hashed (using the original salt) and compared against the hash stored in the database.</a:t>
+            </a:r>
+          </a:p>
+        </p:txBody>
+      </p:sp>
+    </p:spTree>
+    <p:extLst>
+      <p:ext uri="{BB962C8B-B14F-4D97-AF65-F5344CB8AC3E}">
+        <p14:creationId xmlns:p14="http://schemas.microsoft.com/office/powerpoint/2010/main" val="2871695695"/>
+      </p:ext>
+    </p:extLst>
+  </p:cSld>
+  <p:clrMapOvr>
+    <a:masterClrMapping/>
+  </p:clrMapOvr>
+</p:sld>
+</file>
+
+<file path=ppt/slides/slide19.xml><?xml version="1.0" encoding="utf-8"?>
+<p:sld xmlns:a="http://schemas.openxmlformats.org/drawingml/2006/main" xmlns:r="http://schemas.openxmlformats.org/officeDocument/2006/relationships" xmlns:p="http://schemas.openxmlformats.org/presentationml/2006/main">
+  <p:cSld>
+    <p:spTree>
+      <p:nvGrpSpPr>
+        <p:cNvPr id="1" name=""/>
+        <p:cNvGrpSpPr/>
+        <p:nvPr/>
+      </p:nvGrpSpPr>
+      <p:grpSpPr>
+        <a:xfrm>
+          <a:off x="0" y="0"/>
+          <a:ext cx="0" cy="0"/>
+          <a:chOff x="0" y="0"/>
+          <a:chExt cx="0" cy="0"/>
+        </a:xfrm>
+      </p:grpSpPr>
+      <p:sp>
+        <p:nvSpPr>
+          <p:cNvPr id="2" name="Title 1">
+            <a:extLst>
+              <a:ext uri="{FF2B5EF4-FFF2-40B4-BE49-F238E27FC236}">
+                <a16:creationId xmlns:a16="http://schemas.microsoft.com/office/drawing/2014/main" id="{568DA2AA-66A7-9DB0-B74B-DDC5065E84A5}"/>
+              </a:ext>
+            </a:extLst>
+          </p:cNvPr>
+          <p:cNvSpPr>
+            <a:spLocks noGrp="1"/>
+          </p:cNvSpPr>
+          <p:nvPr>
+            <p:ph type="title"/>
+          </p:nvPr>
+        </p:nvSpPr>
+        <p:spPr/>
+        <p:txBody>
+          <a:bodyPr/>
+          <a:lstStyle/>
+          <a:p>
+            <a:r>
+              <a:rPr lang="en-US" dirty="0"/>
+              <a:t>Benefits of password hashing by </a:t>
+            </a:r>
+            <a:r>
+              <a:rPr lang="en-US" dirty="0" err="1"/>
+              <a:t>bcrypt</a:t>
+            </a:r>
+            <a:endParaRPr lang="en-US" dirty="0"/>
+          </a:p>
+        </p:txBody>
+      </p:sp>
+      <p:sp>
+        <p:nvSpPr>
+          <p:cNvPr id="3" name="Content Placeholder 2">
+            <a:extLst>
+              <a:ext uri="{FF2B5EF4-FFF2-40B4-BE49-F238E27FC236}">
+                <a16:creationId xmlns:a16="http://schemas.microsoft.com/office/drawing/2014/main" id="{CFE2C987-A1F4-937B-CE16-309151797693}"/>
+              </a:ext>
+            </a:extLst>
+          </p:cNvPr>
+          <p:cNvSpPr>
+            <a:spLocks noGrp="1"/>
+          </p:cNvSpPr>
+          <p:nvPr>
+            <p:ph idx="1"/>
+          </p:nvPr>
+        </p:nvSpPr>
+        <p:spPr>
+          <a:xfrm>
+            <a:off x="913795" y="1732449"/>
+            <a:ext cx="10353762" cy="4515951"/>
+          </a:xfrm>
+        </p:spPr>
+        <p:txBody>
+          <a:bodyPr>
+            <a:normAutofit fontScale="92500" lnSpcReduction="20000"/>
+          </a:bodyPr>
+          <a:lstStyle/>
+          <a:p>
+            <a:r>
+              <a:rPr lang="en-US" sz="2400" dirty="0" err="1"/>
+              <a:t>Bcrypt</a:t>
+            </a:r>
+            <a:r>
+              <a:rPr lang="en-US" sz="2400" dirty="0"/>
+              <a:t> has significant advantages over other hashing methods like MD5, SHA1, SHA2, and SHA3. They can all perform hashing of a large number of data in less time. Suppose an attacker has a robust system capable of trying 700-900 million passwords in seconds. Your password containing alphanumeric and special character values will be cracked in a few seconds.</a:t>
+            </a:r>
+          </a:p>
+          <a:p>
+            <a:r>
+              <a:rPr lang="en-US" sz="2400" dirty="0"/>
+              <a:t>So, all of these hashing methods cannot be used to encrypt the password. </a:t>
+            </a:r>
+          </a:p>
+          <a:p>
+            <a:pPr marL="36900" indent="0">
+              <a:buNone/>
+            </a:pPr>
+            <a:endParaRPr lang="en-US" sz="2400" b="1" dirty="0"/>
+          </a:p>
+          <a:p>
+            <a:pPr marL="36900" indent="0">
+              <a:buNone/>
+            </a:pPr>
+            <a:r>
+              <a:rPr lang="en-US" sz="2400" b="1" dirty="0"/>
+              <a:t>Now, the main question is, how does </a:t>
+            </a:r>
+            <a:r>
+              <a:rPr lang="en-US" sz="2400" b="1" dirty="0" err="1"/>
+              <a:t>bcrypt</a:t>
+            </a:r>
+            <a:r>
+              <a:rPr lang="en-US" sz="2400" b="1" dirty="0"/>
+              <a:t> provide a significant advantage here? </a:t>
+            </a:r>
+          </a:p>
+          <a:p>
+            <a:r>
+              <a:rPr lang="en-US" sz="2400" dirty="0" err="1"/>
+              <a:t>Bcrypt</a:t>
+            </a:r>
+            <a:r>
+              <a:rPr lang="en-US" sz="2400" dirty="0"/>
+              <a:t> was built upon Blowfish keying schedule and used a work factor, which decides how expensive the hash function will be. After knowing it, </a:t>
+            </a:r>
+            <a:r>
+              <a:rPr lang="en-US" sz="2400" dirty="0" err="1"/>
+              <a:t>bcrypt</a:t>
+            </a:r>
+            <a:r>
+              <a:rPr lang="en-US" sz="2400" dirty="0"/>
+              <a:t> will get slower if an attacker makes multiple requests in a single time frame. So generally, cracking one password will take 12 damn years. Also, </a:t>
+            </a:r>
+            <a:r>
+              <a:rPr lang="en-US" sz="2400" dirty="0" err="1"/>
+              <a:t>bcrypt</a:t>
+            </a:r>
+            <a:r>
+              <a:rPr lang="en-US" sz="2400" dirty="0"/>
+              <a:t> uses salt, which helps prevent attacks like rainbow table attacks and is suitable for securing passwords.</a:t>
+            </a:r>
+          </a:p>
+        </p:txBody>
+      </p:sp>
+    </p:spTree>
+    <p:extLst>
+      <p:ext uri="{BB962C8B-B14F-4D97-AF65-F5344CB8AC3E}">
+        <p14:creationId xmlns:p14="http://schemas.microsoft.com/office/powerpoint/2010/main" val="919555648"/>
+      </p:ext>
+    </p:extLst>
+  </p:cSld>
+  <p:clrMapOvr>
+    <a:masterClrMapping/>
+  </p:clrMapOvr>
+</p:sld>
+</file>
+
+<file path=ppt/slides/slide2.xml><?xml version="1.0" encoding="utf-8"?>
+<p:sld xmlns:a="http://schemas.openxmlformats.org/drawingml/2006/main" xmlns:r="http://schemas.openxmlformats.org/officeDocument/2006/relationships" xmlns:p="http://schemas.openxmlformats.org/presentationml/2006/main">
+  <p:cSld>
+    <p:spTree>
+      <p:nvGrpSpPr>
+        <p:cNvPr id="1" name=""/>
+        <p:cNvGrpSpPr/>
+        <p:nvPr/>
+      </p:nvGrpSpPr>
+      <p:grpSpPr>
+        <a:xfrm>
+          <a:off x="0" y="0"/>
+          <a:ext cx="0" cy="0"/>
+          <a:chOff x="0" y="0"/>
+          <a:chExt cx="0" cy="0"/>
+        </a:xfrm>
+      </p:grpSpPr>
+      <p:sp>
+        <p:nvSpPr>
+          <p:cNvPr id="2" name="Title 1">
+            <a:extLst>
+              <a:ext uri="{FF2B5EF4-FFF2-40B4-BE49-F238E27FC236}">
+                <a16:creationId xmlns:a16="http://schemas.microsoft.com/office/drawing/2014/main" id="{37EB2C0E-8860-D1B1-155C-A3DA044CAE41}"/>
+              </a:ext>
+            </a:extLst>
+          </p:cNvPr>
+          <p:cNvSpPr>
+            <a:spLocks noGrp="1"/>
+          </p:cNvSpPr>
+          <p:nvPr>
+            <p:ph type="title"/>
+          </p:nvPr>
+        </p:nvSpPr>
+        <p:spPr/>
+        <p:txBody>
+          <a:bodyPr anchor="ctr">
+            <a:normAutofit/>
+          </a:bodyPr>
+          <a:lstStyle/>
+          <a:p>
+            <a:r>
+              <a:rPr lang="en-US"/>
+              <a:t>What is hashing?</a:t>
+            </a:r>
+            <a:endParaRPr lang="en-US" dirty="0"/>
+          </a:p>
+        </p:txBody>
+      </p:sp>
+      <p:sp>
+        <p:nvSpPr>
+          <p:cNvPr id="3" name="Content Placeholder 2">
+            <a:extLst>
+              <a:ext uri="{FF2B5EF4-FFF2-40B4-BE49-F238E27FC236}">
+                <a16:creationId xmlns:a16="http://schemas.microsoft.com/office/drawing/2014/main" id="{6ABEF942-E014-D7EE-E96D-F997E5367C0C}"/>
+              </a:ext>
+            </a:extLst>
+          </p:cNvPr>
+          <p:cNvSpPr>
+            <a:spLocks noGrp="1"/>
+          </p:cNvSpPr>
+          <p:nvPr>
+            <p:ph idx="1"/>
+          </p:nvPr>
+        </p:nvSpPr>
+        <p:spPr>
+          <a:xfrm>
+            <a:off x="720000" y="2096528"/>
+            <a:ext cx="10728325" cy="3672447"/>
+          </a:xfrm>
+        </p:spPr>
+        <p:txBody>
+          <a:bodyPr anchor="ctr">
+            <a:normAutofit/>
+          </a:bodyPr>
+          <a:lstStyle/>
+          <a:p>
+            <a:pPr marL="0" indent="0">
+              <a:buNone/>
+            </a:pPr>
+            <a:r>
+              <a:rPr lang="en-US" sz="2800" b="0" i="0">
+                <a:solidFill>
+                  <a:srgbClr val="E8EAED"/>
+                </a:solidFill>
+                <a:effectLst/>
+                <a:latin typeface="Google Sans"/>
+              </a:rPr>
+              <a:t>Hashing is </a:t>
+            </a:r>
+            <a:r>
+              <a:rPr lang="en-US" sz="2800" b="0" i="0">
+                <a:solidFill>
+                  <a:srgbClr val="E2EEFF"/>
+                </a:solidFill>
+                <a:effectLst/>
+                <a:latin typeface="Google Sans"/>
+              </a:rPr>
+              <a:t>the process of transforming any given key or a string of characters into another value</a:t>
+            </a:r>
+            <a:r>
+              <a:rPr lang="en-US" sz="2800" b="0" i="0">
+                <a:solidFill>
+                  <a:srgbClr val="E8EAED"/>
+                </a:solidFill>
+                <a:effectLst/>
+                <a:latin typeface="Google Sans"/>
+              </a:rPr>
+              <a:t>. This is usually represented by a shorter, fixed-length value or key that represents and makes it easier to find or employ the original string.</a:t>
+            </a:r>
+            <a:endParaRPr lang="en-US" sz="2800" b="0" i="0" dirty="0">
+              <a:solidFill>
+                <a:srgbClr val="E8EAED"/>
+              </a:solidFill>
+              <a:effectLst/>
+              <a:latin typeface="Google Sans"/>
+            </a:endParaRPr>
+          </a:p>
+        </p:txBody>
+      </p:sp>
+    </p:spTree>
+    <p:extLst>
+      <p:ext uri="{BB962C8B-B14F-4D97-AF65-F5344CB8AC3E}">
+        <p14:creationId xmlns:p14="http://schemas.microsoft.com/office/powerpoint/2010/main" val="1815938852"/>
+      </p:ext>
+    </p:extLst>
+  </p:cSld>
+  <p:clrMapOvr>
+    <a:masterClrMapping/>
+  </p:clrMapOvr>
+</p:sld>
+</file>
+
+<file path=ppt/slides/slide20.xml><?xml version="1.0" encoding="utf-8"?>
 <p:sld xmlns:a="http://schemas.openxmlformats.org/drawingml/2006/main" xmlns:r="http://schemas.openxmlformats.org/officeDocument/2006/relationships" xmlns:p="http://schemas.openxmlformats.org/presentationml/2006/main">
   <p:cSld>
     <p:spTree>
@@ -16472,7 +17872,7 @@
 </p:sld>
 </file>
 
-<file path=ppt/slides/slide14.xml><?xml version="1.0" encoding="utf-8"?>
+<file path=ppt/slides/slide21.xml><?xml version="1.0" encoding="utf-8"?>
 <p:sld xmlns:a="http://schemas.openxmlformats.org/drawingml/2006/main" xmlns:r="http://schemas.openxmlformats.org/officeDocument/2006/relationships" xmlns:p="http://schemas.openxmlformats.org/presentationml/2006/main">
   <p:cSld>
     <p:spTree>
@@ -16732,7 +18132,7 @@
 </p:sld>
 </file>
 
-<file path=ppt/slides/slide15.xml><?xml version="1.0" encoding="utf-8"?>
+<file path=ppt/slides/slide22.xml><?xml version="1.0" encoding="utf-8"?>
 <p:sld xmlns:a="http://schemas.openxmlformats.org/drawingml/2006/main" xmlns:r="http://schemas.openxmlformats.org/officeDocument/2006/relationships" xmlns:p="http://schemas.openxmlformats.org/presentationml/2006/main">
   <p:cSld>
     <p:spTree>
@@ -16809,7 +18209,7 @@
 </p:sld>
 </file>
 
-<file path=ppt/slides/slide16.xml><?xml version="1.0" encoding="utf-8"?>
+<file path=ppt/slides/slide23.xml><?xml version="1.0" encoding="utf-8"?>
 <p:sld xmlns:a="http://schemas.openxmlformats.org/drawingml/2006/main" xmlns:r="http://schemas.openxmlformats.org/officeDocument/2006/relationships" xmlns:p="http://schemas.openxmlformats.org/presentationml/2006/main">
   <p:cSld>
     <p:spTree>
@@ -17362,7 +18762,7 @@
 </p:sld>
 </file>
 
-<file path=ppt/slides/slide17.xml><?xml version="1.0" encoding="utf-8"?>
+<file path=ppt/slides/slide24.xml><?xml version="1.0" encoding="utf-8"?>
 <p:sld xmlns:a="http://schemas.openxmlformats.org/drawingml/2006/main" xmlns:r="http://schemas.openxmlformats.org/officeDocument/2006/relationships" xmlns:p="http://schemas.openxmlformats.org/presentationml/2006/main">
   <p:cSld>
     <p:spTree>
@@ -17846,7 +19246,7 @@
 </p:sld>
 </file>
 
-<file path=ppt/slides/slide18.xml><?xml version="1.0" encoding="utf-8"?>
+<file path=ppt/slides/slide25.xml><?xml version="1.0" encoding="utf-8"?>
 <p:sld xmlns:a="http://schemas.openxmlformats.org/drawingml/2006/main" xmlns:r="http://schemas.openxmlformats.org/officeDocument/2006/relationships" xmlns:p="http://schemas.openxmlformats.org/presentationml/2006/main">
   <p:cSld>
     <p:spTree>
@@ -19074,7 +20474,7 @@
 </p:sld>
 </file>
 
-<file path=ppt/slides/slide19.xml><?xml version="1.0" encoding="utf-8"?>
+<file path=ppt/slides/slide26.xml><?xml version="1.0" encoding="utf-8"?>
 <p:sld xmlns:a="http://schemas.openxmlformats.org/drawingml/2006/main" xmlns:r="http://schemas.openxmlformats.org/officeDocument/2006/relationships" xmlns:p="http://schemas.openxmlformats.org/presentationml/2006/main">
   <p:cSld>
     <p:spTree>
@@ -20337,139 +21737,7 @@
 </p:sld>
 </file>
 
-<file path=ppt/slides/slide2.xml><?xml version="1.0" encoding="utf-8"?>
-<p:sld xmlns:a="http://schemas.openxmlformats.org/drawingml/2006/main" xmlns:r="http://schemas.openxmlformats.org/officeDocument/2006/relationships" xmlns:p="http://schemas.openxmlformats.org/presentationml/2006/main">
-  <p:cSld>
-    <p:spTree>
-      <p:nvGrpSpPr>
-        <p:cNvPr id="1" name=""/>
-        <p:cNvGrpSpPr/>
-        <p:nvPr/>
-      </p:nvGrpSpPr>
-      <p:grpSpPr>
-        <a:xfrm>
-          <a:off x="0" y="0"/>
-          <a:ext cx="0" cy="0"/>
-          <a:chOff x="0" y="0"/>
-          <a:chExt cx="0" cy="0"/>
-        </a:xfrm>
-      </p:grpSpPr>
-      <p:sp>
-        <p:nvSpPr>
-          <p:cNvPr id="2" name="Title 1">
-            <a:extLst>
-              <a:ext uri="{FF2B5EF4-FFF2-40B4-BE49-F238E27FC236}">
-                <a16:creationId xmlns:a16="http://schemas.microsoft.com/office/drawing/2014/main" id="{37EB2C0E-8860-D1B1-155C-A3DA044CAE41}"/>
-              </a:ext>
-            </a:extLst>
-          </p:cNvPr>
-          <p:cNvSpPr>
-            <a:spLocks noGrp="1"/>
-          </p:cNvSpPr>
-          <p:nvPr>
-            <p:ph type="title"/>
-          </p:nvPr>
-        </p:nvSpPr>
-        <p:spPr/>
-        <p:txBody>
-          <a:bodyPr anchor="ctr">
-            <a:normAutofit/>
-          </a:bodyPr>
-          <a:lstStyle/>
-          <a:p>
-            <a:r>
-              <a:rPr lang="en-US"/>
-              <a:t>What is hashing?</a:t>
-            </a:r>
-            <a:endParaRPr lang="en-US" dirty="0"/>
-          </a:p>
-        </p:txBody>
-      </p:sp>
-      <p:sp>
-        <p:nvSpPr>
-          <p:cNvPr id="3" name="Content Placeholder 2">
-            <a:extLst>
-              <a:ext uri="{FF2B5EF4-FFF2-40B4-BE49-F238E27FC236}">
-                <a16:creationId xmlns:a16="http://schemas.microsoft.com/office/drawing/2014/main" id="{6ABEF942-E014-D7EE-E96D-F997E5367C0C}"/>
-              </a:ext>
-            </a:extLst>
-          </p:cNvPr>
-          <p:cNvSpPr>
-            <a:spLocks noGrp="1"/>
-          </p:cNvSpPr>
-          <p:nvPr>
-            <p:ph idx="1"/>
-          </p:nvPr>
-        </p:nvSpPr>
-        <p:spPr>
-          <a:xfrm>
-            <a:off x="720000" y="2096528"/>
-            <a:ext cx="10728325" cy="3672447"/>
-          </a:xfrm>
-        </p:spPr>
-        <p:txBody>
-          <a:bodyPr anchor="ctr">
-            <a:normAutofit/>
-          </a:bodyPr>
-          <a:lstStyle/>
-          <a:p>
-            <a:pPr marL="0" indent="0">
-              <a:buNone/>
-            </a:pPr>
-            <a:r>
-              <a:rPr lang="en-US" sz="2800" b="0" i="0">
-                <a:solidFill>
-                  <a:srgbClr val="E8EAED"/>
-                </a:solidFill>
-                <a:effectLst/>
-                <a:latin typeface="Google Sans"/>
-              </a:rPr>
-              <a:t>Hashing is </a:t>
-            </a:r>
-            <a:r>
-              <a:rPr lang="en-US" sz="2800" b="0" i="0">
-                <a:solidFill>
-                  <a:srgbClr val="E2EEFF"/>
-                </a:solidFill>
-                <a:effectLst/>
-                <a:latin typeface="Google Sans"/>
-              </a:rPr>
-              <a:t>the process of transforming any given key or a string of characters into another value</a:t>
-            </a:r>
-            <a:r>
-              <a:rPr lang="en-US" sz="2800" b="0" i="0">
-                <a:solidFill>
-                  <a:srgbClr val="E8EAED"/>
-                </a:solidFill>
-                <a:effectLst/>
-                <a:latin typeface="Google Sans"/>
-              </a:rPr>
-              <a:t>. This is usually represented by a shorter, fixed-length value or key that represents and makes it easier to find or employ the original string.</a:t>
-            </a:r>
-            <a:endParaRPr lang="en-US" sz="2800" b="0" i="0" dirty="0">
-              <a:solidFill>
-                <a:srgbClr val="E8EAED"/>
-              </a:solidFill>
-              <a:effectLst/>
-              <a:latin typeface="Google Sans"/>
-            </a:endParaRPr>
-          </a:p>
-        </p:txBody>
-      </p:sp>
-    </p:spTree>
-    <p:extLst>
-      <p:ext uri="{BB962C8B-B14F-4D97-AF65-F5344CB8AC3E}">
-        <p14:creationId xmlns:p14="http://schemas.microsoft.com/office/powerpoint/2010/main" val="1815938852"/>
-      </p:ext>
-    </p:extLst>
-  </p:cSld>
-  <p:clrMapOvr>
-    <a:masterClrMapping/>
-  </p:clrMapOvr>
-</p:sld>
-</file>
-
-<file path=ppt/slides/slide20.xml><?xml version="1.0" encoding="utf-8"?>
+<file path=ppt/slides/slide27.xml><?xml version="1.0" encoding="utf-8"?>
 <p:sld xmlns:a="http://schemas.openxmlformats.org/drawingml/2006/main" xmlns:r="http://schemas.openxmlformats.org/officeDocument/2006/relationships" xmlns:p="http://schemas.openxmlformats.org/presentationml/2006/main">
   <p:cSld>
     <p:spTree>
@@ -22361,7 +23629,7 @@
 </p:sld>
 </file>
 
-<file path=ppt/slides/slide21.xml><?xml version="1.0" encoding="utf-8"?>
+<file path=ppt/slides/slide28.xml><?xml version="1.0" encoding="utf-8"?>
 <p:sld xmlns:a="http://schemas.openxmlformats.org/drawingml/2006/main" xmlns:r="http://schemas.openxmlformats.org/officeDocument/2006/relationships" xmlns:p="http://schemas.openxmlformats.org/presentationml/2006/main">
   <p:cSld>
     <p:spTree>
@@ -22515,7 +23783,7 @@
 </p:sld>
 </file>
 
-<file path=ppt/slides/slide22.xml><?xml version="1.0" encoding="utf-8"?>
+<file path=ppt/slides/slide29.xml><?xml version="1.0" encoding="utf-8"?>
 <p:sld xmlns:a="http://schemas.openxmlformats.org/drawingml/2006/main" xmlns:r="http://schemas.openxmlformats.org/officeDocument/2006/relationships" xmlns:p="http://schemas.openxmlformats.org/presentationml/2006/main">
   <p:cSld>
     <p:spTree>
@@ -22805,7 +24073,204 @@
 </p:sld>
 </file>
 
-<file path=ppt/slides/slide23.xml><?xml version="1.0" encoding="utf-8"?>
+<file path=ppt/slides/slide3.xml><?xml version="1.0" encoding="utf-8"?>
+<p:sld xmlns:a="http://schemas.openxmlformats.org/drawingml/2006/main" xmlns:r="http://schemas.openxmlformats.org/officeDocument/2006/relationships" xmlns:p="http://schemas.openxmlformats.org/presentationml/2006/main">
+  <p:cSld>
+    <p:spTree>
+      <p:nvGrpSpPr>
+        <p:cNvPr id="1" name=""/>
+        <p:cNvGrpSpPr/>
+        <p:nvPr/>
+      </p:nvGrpSpPr>
+      <p:grpSpPr>
+        <a:xfrm>
+          <a:off x="0" y="0"/>
+          <a:ext cx="0" cy="0"/>
+          <a:chOff x="0" y="0"/>
+          <a:chExt cx="0" cy="0"/>
+        </a:xfrm>
+      </p:grpSpPr>
+      <p:sp>
+        <p:nvSpPr>
+          <p:cNvPr id="2" name="Title 1">
+            <a:extLst>
+              <a:ext uri="{FF2B5EF4-FFF2-40B4-BE49-F238E27FC236}">
+                <a16:creationId xmlns:a16="http://schemas.microsoft.com/office/drawing/2014/main" id="{51097547-AA26-D542-C16D-3ED6767718DF}"/>
+              </a:ext>
+            </a:extLst>
+          </p:cNvPr>
+          <p:cNvSpPr>
+            <a:spLocks noGrp="1"/>
+          </p:cNvSpPr>
+          <p:nvPr>
+            <p:ph type="title"/>
+          </p:nvPr>
+        </p:nvSpPr>
+        <p:spPr/>
+        <p:txBody>
+          <a:bodyPr anchor="ctr">
+            <a:normAutofit/>
+          </a:bodyPr>
+          <a:lstStyle/>
+          <a:p>
+            <a:r>
+              <a:rPr lang="en-US" dirty="0"/>
+              <a:t>Hashing Characteristics</a:t>
+            </a:r>
+          </a:p>
+        </p:txBody>
+      </p:sp>
+      <p:sp>
+        <p:nvSpPr>
+          <p:cNvPr id="3" name="Content Placeholder 2">
+            <a:extLst>
+              <a:ext uri="{FF2B5EF4-FFF2-40B4-BE49-F238E27FC236}">
+                <a16:creationId xmlns:a16="http://schemas.microsoft.com/office/drawing/2014/main" id="{1F367A87-D52D-B0BE-D752-C43E17789C1B}"/>
+              </a:ext>
+            </a:extLst>
+          </p:cNvPr>
+          <p:cNvSpPr>
+            <a:spLocks noGrp="1"/>
+          </p:cNvSpPr>
+          <p:nvPr>
+            <p:ph idx="1"/>
+          </p:nvPr>
+        </p:nvSpPr>
+        <p:spPr>
+          <a:xfrm>
+            <a:off x="720000" y="1580050"/>
+            <a:ext cx="10728325" cy="4658750"/>
+          </a:xfrm>
+        </p:spPr>
+        <p:txBody>
+          <a:bodyPr anchor="ctr">
+            <a:normAutofit/>
+          </a:bodyPr>
+          <a:lstStyle/>
+          <a:p>
+            <a:pPr algn="l">
+              <a:buFont typeface="+mj-lt"/>
+              <a:buAutoNum type="arabicPeriod"/>
+            </a:pPr>
+            <a:r>
+              <a:rPr lang="en-US" sz="2400" b="1" i="0" dirty="0">
+                <a:solidFill>
+                  <a:srgbClr val="D1D5DB"/>
+                </a:solidFill>
+                <a:effectLst/>
+                <a:latin typeface="Söhne"/>
+              </a:rPr>
+              <a:t>Deterministic:</a:t>
+            </a:r>
+            <a:endParaRPr lang="en-US" sz="2400" b="0" i="0" dirty="0">
+              <a:solidFill>
+                <a:srgbClr val="D1D5DB"/>
+              </a:solidFill>
+              <a:effectLst/>
+              <a:latin typeface="Söhne"/>
+            </a:endParaRPr>
+          </a:p>
+          <a:p>
+            <a:pPr lvl="1"/>
+            <a:r>
+              <a:rPr lang="en-US" sz="2000" b="0" i="0" dirty="0">
+                <a:solidFill>
+                  <a:srgbClr val="D1D5DB"/>
+                </a:solidFill>
+                <a:effectLst/>
+                <a:latin typeface="Söhne"/>
+              </a:rPr>
+              <a:t>The same input will always produce the same hash value. This is important in verification and comparison purposes.</a:t>
+            </a:r>
+          </a:p>
+          <a:p>
+            <a:pPr algn="l">
+              <a:buFont typeface="+mj-lt"/>
+              <a:buAutoNum type="arabicPeriod"/>
+            </a:pPr>
+            <a:r>
+              <a:rPr lang="en-US" sz="2400" b="1" i="0" dirty="0">
+                <a:solidFill>
+                  <a:srgbClr val="D1D5DB"/>
+                </a:solidFill>
+                <a:effectLst/>
+                <a:latin typeface="Söhne"/>
+              </a:rPr>
+              <a:t>Fixed Output Length:</a:t>
+            </a:r>
+            <a:endParaRPr lang="en-US" sz="2400" b="0" i="0" dirty="0">
+              <a:solidFill>
+                <a:srgbClr val="D1D5DB"/>
+              </a:solidFill>
+              <a:effectLst/>
+              <a:latin typeface="Söhne"/>
+            </a:endParaRPr>
+          </a:p>
+          <a:p>
+            <a:pPr lvl="1"/>
+            <a:r>
+              <a:rPr lang="en-US" sz="2000" b="0" i="0" dirty="0">
+                <a:solidFill>
+                  <a:srgbClr val="D1D5DB"/>
+                </a:solidFill>
+                <a:effectLst/>
+                <a:latin typeface="Söhne"/>
+              </a:rPr>
+              <a:t>Regardless of the input size, the hash function will always generate a fixed-length output. This is handy for creating consistency in data representation.</a:t>
+            </a:r>
+          </a:p>
+          <a:p>
+            <a:pPr algn="l">
+              <a:buFont typeface="+mj-lt"/>
+              <a:buAutoNum type="arabicPeriod"/>
+            </a:pPr>
+            <a:r>
+              <a:rPr lang="en-US" sz="2400" b="1" i="0" dirty="0">
+                <a:solidFill>
+                  <a:srgbClr val="D1D5DB"/>
+                </a:solidFill>
+                <a:effectLst/>
+                <a:latin typeface="Söhne"/>
+              </a:rPr>
+              <a:t>Efficient:</a:t>
+            </a:r>
+            <a:endParaRPr lang="en-US" sz="2400" b="0" i="0" dirty="0">
+              <a:solidFill>
+                <a:srgbClr val="D1D5DB"/>
+              </a:solidFill>
+              <a:effectLst/>
+              <a:latin typeface="Söhne"/>
+            </a:endParaRPr>
+          </a:p>
+          <a:p>
+            <a:pPr lvl="1"/>
+            <a:r>
+              <a:rPr lang="en-US" sz="2000" b="0" i="0" dirty="0">
+                <a:solidFill>
+                  <a:srgbClr val="D1D5DB"/>
+                </a:solidFill>
+                <a:effectLst/>
+                <a:latin typeface="Söhne"/>
+              </a:rPr>
+              <a:t>Hashing is designed to be fast and efficient. This is important in applications like encryption, where speed is a critical factor.</a:t>
+            </a:r>
+          </a:p>
+        </p:txBody>
+      </p:sp>
+    </p:spTree>
+    <p:extLst>
+      <p:ext uri="{BB962C8B-B14F-4D97-AF65-F5344CB8AC3E}">
+        <p14:creationId xmlns:p14="http://schemas.microsoft.com/office/powerpoint/2010/main" val="331344060"/>
+      </p:ext>
+    </p:extLst>
+  </p:cSld>
+  <p:clrMapOvr>
+    <a:masterClrMapping/>
+  </p:clrMapOvr>
+</p:sld>
+</file>
+
+<file path=ppt/slides/slide30.xml><?xml version="1.0" encoding="utf-8"?>
 <p:sld xmlns:a="http://schemas.openxmlformats.org/drawingml/2006/main" xmlns:r="http://schemas.openxmlformats.org/officeDocument/2006/relationships" xmlns:p="http://schemas.openxmlformats.org/presentationml/2006/main">
   <p:cSld>
     <p:spTree>
@@ -22913,7 +24378,7 @@
 </p:sld>
 </file>
 
-<file path=ppt/slides/slide24.xml><?xml version="1.0" encoding="utf-8"?>
+<file path=ppt/slides/slide31.xml><?xml version="1.0" encoding="utf-8"?>
 <p:sld xmlns:a="http://schemas.openxmlformats.org/drawingml/2006/main" xmlns:r="http://schemas.openxmlformats.org/officeDocument/2006/relationships" xmlns:p="http://schemas.openxmlformats.org/presentationml/2006/main">
   <p:cSld>
     <p:spTree>
@@ -23257,7 +24722,7 @@
 </p:sld>
 </file>
 
-<file path=ppt/slides/slide25.xml><?xml version="1.0" encoding="utf-8"?>
+<file path=ppt/slides/slide32.xml><?xml version="1.0" encoding="utf-8"?>
 <p:sld xmlns:a="http://schemas.openxmlformats.org/drawingml/2006/main" xmlns:r="http://schemas.openxmlformats.org/officeDocument/2006/relationships" xmlns:p="http://schemas.openxmlformats.org/presentationml/2006/main">
   <p:cSld>
     <p:spTree>
@@ -23368,7 +24833,7 @@
 </p:sld>
 </file>
 
-<file path=ppt/slides/slide26.xml><?xml version="1.0" encoding="utf-8"?>
+<file path=ppt/slides/slide33.xml><?xml version="1.0" encoding="utf-8"?>
 <p:sld xmlns:a="http://schemas.openxmlformats.org/drawingml/2006/main" xmlns:r="http://schemas.openxmlformats.org/officeDocument/2006/relationships" xmlns:p="http://schemas.openxmlformats.org/presentationml/2006/main">
   <p:cSld>
     <p:spTree>
@@ -23439,7 +24904,7 @@
 </p:sld>
 </file>
 
-<file path=ppt/slides/slide27.xml><?xml version="1.0" encoding="utf-8"?>
+<file path=ppt/slides/slide34.xml><?xml version="1.0" encoding="utf-8"?>
 <p:sld xmlns:a="http://schemas.openxmlformats.org/drawingml/2006/main" xmlns:r="http://schemas.openxmlformats.org/officeDocument/2006/relationships" xmlns:p="http://schemas.openxmlformats.org/presentationml/2006/main">
   <p:cSld>
     <p:spTree>
@@ -23553,7 +25018,7 @@
 </p:sld>
 </file>
 
-<file path=ppt/slides/slide28.xml><?xml version="1.0" encoding="utf-8"?>
+<file path=ppt/slides/slide35.xml><?xml version="1.0" encoding="utf-8"?>
 <p:sld xmlns:a="http://schemas.openxmlformats.org/drawingml/2006/main" xmlns:r="http://schemas.openxmlformats.org/officeDocument/2006/relationships" xmlns:p="http://schemas.openxmlformats.org/presentationml/2006/main">
   <p:cSld>
     <p:spTree>
@@ -23630,7 +25095,7 @@
 </p:sld>
 </file>
 
-<file path=ppt/slides/slide29.xml><?xml version="1.0" encoding="utf-8"?>
+<file path=ppt/slides/slide36.xml><?xml version="1.0" encoding="utf-8"?>
 <p:sld xmlns:a="http://schemas.openxmlformats.org/drawingml/2006/main" xmlns:r="http://schemas.openxmlformats.org/officeDocument/2006/relationships" xmlns:p="http://schemas.openxmlformats.org/presentationml/2006/main">
   <p:cSld>
     <p:spTree>
@@ -23741,204 +25206,7 @@
 </p:sld>
 </file>
 
-<file path=ppt/slides/slide3.xml><?xml version="1.0" encoding="utf-8"?>
-<p:sld xmlns:a="http://schemas.openxmlformats.org/drawingml/2006/main" xmlns:r="http://schemas.openxmlformats.org/officeDocument/2006/relationships" xmlns:p="http://schemas.openxmlformats.org/presentationml/2006/main">
-  <p:cSld>
-    <p:spTree>
-      <p:nvGrpSpPr>
-        <p:cNvPr id="1" name=""/>
-        <p:cNvGrpSpPr/>
-        <p:nvPr/>
-      </p:nvGrpSpPr>
-      <p:grpSpPr>
-        <a:xfrm>
-          <a:off x="0" y="0"/>
-          <a:ext cx="0" cy="0"/>
-          <a:chOff x="0" y="0"/>
-          <a:chExt cx="0" cy="0"/>
-        </a:xfrm>
-      </p:grpSpPr>
-      <p:sp>
-        <p:nvSpPr>
-          <p:cNvPr id="2" name="Title 1">
-            <a:extLst>
-              <a:ext uri="{FF2B5EF4-FFF2-40B4-BE49-F238E27FC236}">
-                <a16:creationId xmlns:a16="http://schemas.microsoft.com/office/drawing/2014/main" id="{51097547-AA26-D542-C16D-3ED6767718DF}"/>
-              </a:ext>
-            </a:extLst>
-          </p:cNvPr>
-          <p:cNvSpPr>
-            <a:spLocks noGrp="1"/>
-          </p:cNvSpPr>
-          <p:nvPr>
-            <p:ph type="title"/>
-          </p:nvPr>
-        </p:nvSpPr>
-        <p:spPr/>
-        <p:txBody>
-          <a:bodyPr anchor="ctr">
-            <a:normAutofit/>
-          </a:bodyPr>
-          <a:lstStyle/>
-          <a:p>
-            <a:r>
-              <a:rPr lang="en-US" dirty="0"/>
-              <a:t>Hashing Characteristics</a:t>
-            </a:r>
-          </a:p>
-        </p:txBody>
-      </p:sp>
-      <p:sp>
-        <p:nvSpPr>
-          <p:cNvPr id="3" name="Content Placeholder 2">
-            <a:extLst>
-              <a:ext uri="{FF2B5EF4-FFF2-40B4-BE49-F238E27FC236}">
-                <a16:creationId xmlns:a16="http://schemas.microsoft.com/office/drawing/2014/main" id="{1F367A87-D52D-B0BE-D752-C43E17789C1B}"/>
-              </a:ext>
-            </a:extLst>
-          </p:cNvPr>
-          <p:cNvSpPr>
-            <a:spLocks noGrp="1"/>
-          </p:cNvSpPr>
-          <p:nvPr>
-            <p:ph idx="1"/>
-          </p:nvPr>
-        </p:nvSpPr>
-        <p:spPr>
-          <a:xfrm>
-            <a:off x="720000" y="1580050"/>
-            <a:ext cx="10728325" cy="4658750"/>
-          </a:xfrm>
-        </p:spPr>
-        <p:txBody>
-          <a:bodyPr anchor="ctr">
-            <a:normAutofit/>
-          </a:bodyPr>
-          <a:lstStyle/>
-          <a:p>
-            <a:pPr algn="l">
-              <a:buFont typeface="+mj-lt"/>
-              <a:buAutoNum type="arabicPeriod"/>
-            </a:pPr>
-            <a:r>
-              <a:rPr lang="en-US" sz="2400" b="1" i="0" dirty="0">
-                <a:solidFill>
-                  <a:srgbClr val="D1D5DB"/>
-                </a:solidFill>
-                <a:effectLst/>
-                <a:latin typeface="Söhne"/>
-              </a:rPr>
-              <a:t>Deterministic:</a:t>
-            </a:r>
-            <a:endParaRPr lang="en-US" sz="2400" b="0" i="0" dirty="0">
-              <a:solidFill>
-                <a:srgbClr val="D1D5DB"/>
-              </a:solidFill>
-              <a:effectLst/>
-              <a:latin typeface="Söhne"/>
-            </a:endParaRPr>
-          </a:p>
-          <a:p>
-            <a:pPr lvl="1"/>
-            <a:r>
-              <a:rPr lang="en-US" sz="2000" b="0" i="0" dirty="0">
-                <a:solidFill>
-                  <a:srgbClr val="D1D5DB"/>
-                </a:solidFill>
-                <a:effectLst/>
-                <a:latin typeface="Söhne"/>
-              </a:rPr>
-              <a:t>The same input will always produce the same hash value. This is important in verification and comparison purposes.</a:t>
-            </a:r>
-          </a:p>
-          <a:p>
-            <a:pPr algn="l">
-              <a:buFont typeface="+mj-lt"/>
-              <a:buAutoNum type="arabicPeriod"/>
-            </a:pPr>
-            <a:r>
-              <a:rPr lang="en-US" sz="2400" b="1" i="0" dirty="0">
-                <a:solidFill>
-                  <a:srgbClr val="D1D5DB"/>
-                </a:solidFill>
-                <a:effectLst/>
-                <a:latin typeface="Söhne"/>
-              </a:rPr>
-              <a:t>Fixed Output Length:</a:t>
-            </a:r>
-            <a:endParaRPr lang="en-US" sz="2400" b="0" i="0" dirty="0">
-              <a:solidFill>
-                <a:srgbClr val="D1D5DB"/>
-              </a:solidFill>
-              <a:effectLst/>
-              <a:latin typeface="Söhne"/>
-            </a:endParaRPr>
-          </a:p>
-          <a:p>
-            <a:pPr lvl="1"/>
-            <a:r>
-              <a:rPr lang="en-US" sz="2000" b="0" i="0" dirty="0">
-                <a:solidFill>
-                  <a:srgbClr val="D1D5DB"/>
-                </a:solidFill>
-                <a:effectLst/>
-                <a:latin typeface="Söhne"/>
-              </a:rPr>
-              <a:t>Regardless of the input size, the hash function will always generate a fixed-length output. This is handy for creating consistency in data representation.</a:t>
-            </a:r>
-          </a:p>
-          <a:p>
-            <a:pPr algn="l">
-              <a:buFont typeface="+mj-lt"/>
-              <a:buAutoNum type="arabicPeriod"/>
-            </a:pPr>
-            <a:r>
-              <a:rPr lang="en-US" sz="2400" b="1" i="0" dirty="0">
-                <a:solidFill>
-                  <a:srgbClr val="D1D5DB"/>
-                </a:solidFill>
-                <a:effectLst/>
-                <a:latin typeface="Söhne"/>
-              </a:rPr>
-              <a:t>Efficient:</a:t>
-            </a:r>
-            <a:endParaRPr lang="en-US" sz="2400" b="0" i="0" dirty="0">
-              <a:solidFill>
-                <a:srgbClr val="D1D5DB"/>
-              </a:solidFill>
-              <a:effectLst/>
-              <a:latin typeface="Söhne"/>
-            </a:endParaRPr>
-          </a:p>
-          <a:p>
-            <a:pPr lvl="1"/>
-            <a:r>
-              <a:rPr lang="en-US" sz="2000" b="0" i="0" dirty="0">
-                <a:solidFill>
-                  <a:srgbClr val="D1D5DB"/>
-                </a:solidFill>
-                <a:effectLst/>
-                <a:latin typeface="Söhne"/>
-              </a:rPr>
-              <a:t>Hashing is designed to be fast and efficient. This is important in applications like encryption, where speed is a critical factor.</a:t>
-            </a:r>
-          </a:p>
-        </p:txBody>
-      </p:sp>
-    </p:spTree>
-    <p:extLst>
-      <p:ext uri="{BB962C8B-B14F-4D97-AF65-F5344CB8AC3E}">
-        <p14:creationId xmlns:p14="http://schemas.microsoft.com/office/powerpoint/2010/main" val="331344060"/>
-      </p:ext>
-    </p:extLst>
-  </p:cSld>
-  <p:clrMapOvr>
-    <a:masterClrMapping/>
-  </p:clrMapOvr>
-</p:sld>
-</file>
-
-<file path=ppt/slides/slide30.xml><?xml version="1.0" encoding="utf-8"?>
+<file path=ppt/slides/slide37.xml><?xml version="1.0" encoding="utf-8"?>
 <p:sld xmlns:a="http://schemas.openxmlformats.org/drawingml/2006/main" xmlns:r="http://schemas.openxmlformats.org/officeDocument/2006/relationships" xmlns:p="http://schemas.openxmlformats.org/presentationml/2006/main">
   <p:cSld>
     <p:spTree>
@@ -24046,6 +25314,219 @@
     <p:extLst>
       <p:ext uri="{BB962C8B-B14F-4D97-AF65-F5344CB8AC3E}">
         <p14:creationId xmlns:p14="http://schemas.microsoft.com/office/powerpoint/2010/main" val="1993703243"/>
+      </p:ext>
+    </p:extLst>
+  </p:cSld>
+  <p:clrMapOvr>
+    <a:masterClrMapping/>
+  </p:clrMapOvr>
+</p:sld>
+</file>
+
+<file path=ppt/slides/slide38.xml><?xml version="1.0" encoding="utf-8"?>
+<p:sld xmlns:a="http://schemas.openxmlformats.org/drawingml/2006/main" xmlns:r="http://schemas.openxmlformats.org/officeDocument/2006/relationships" xmlns:p="http://schemas.openxmlformats.org/presentationml/2006/main">
+  <p:cSld>
+    <p:spTree>
+      <p:nvGrpSpPr>
+        <p:cNvPr id="1" name=""/>
+        <p:cNvGrpSpPr/>
+        <p:nvPr/>
+      </p:nvGrpSpPr>
+      <p:grpSpPr>
+        <a:xfrm>
+          <a:off x="0" y="0"/>
+          <a:ext cx="0" cy="0"/>
+          <a:chOff x="0" y="0"/>
+          <a:chExt cx="0" cy="0"/>
+        </a:xfrm>
+      </p:grpSpPr>
+      <p:sp>
+        <p:nvSpPr>
+          <p:cNvPr id="2" name="Title 1">
+            <a:extLst>
+              <a:ext uri="{FF2B5EF4-FFF2-40B4-BE49-F238E27FC236}">
+                <a16:creationId xmlns:a16="http://schemas.microsoft.com/office/drawing/2014/main" id="{4CB1C1FB-D83A-5AC9-E258-D68D47F9BF5D}"/>
+              </a:ext>
+            </a:extLst>
+          </p:cNvPr>
+          <p:cNvSpPr>
+            <a:spLocks noGrp="1"/>
+          </p:cNvSpPr>
+          <p:nvPr>
+            <p:ph type="title"/>
+          </p:nvPr>
+        </p:nvSpPr>
+        <p:spPr/>
+        <p:txBody>
+          <a:bodyPr/>
+          <a:lstStyle/>
+          <a:p>
+            <a:r>
+              <a:rPr lang="en-US" dirty="0"/>
+              <a:t>Tiger</a:t>
+            </a:r>
+          </a:p>
+        </p:txBody>
+      </p:sp>
+      <p:sp>
+        <p:nvSpPr>
+          <p:cNvPr id="3" name="Content Placeholder 2">
+            <a:extLst>
+              <a:ext uri="{FF2B5EF4-FFF2-40B4-BE49-F238E27FC236}">
+                <a16:creationId xmlns:a16="http://schemas.microsoft.com/office/drawing/2014/main" id="{919BBC2D-5F6B-D904-F2F2-9888CC4A96D1}"/>
+              </a:ext>
+            </a:extLst>
+          </p:cNvPr>
+          <p:cNvSpPr>
+            <a:spLocks noGrp="1"/>
+          </p:cNvSpPr>
+          <p:nvPr>
+            <p:ph idx="1"/>
+          </p:nvPr>
+        </p:nvSpPr>
+        <p:spPr/>
+        <p:txBody>
+          <a:bodyPr anchor="ctr">
+            <a:normAutofit/>
+          </a:bodyPr>
+          <a:lstStyle/>
+          <a:p>
+            <a:pPr marL="36900" indent="0">
+              <a:buNone/>
+            </a:pPr>
+            <a:r>
+              <a:rPr lang="en-US" sz="2800" dirty="0"/>
+              <a:t>Tiger is a cryptographic hash function designed by Ross Anderson and Eli </a:t>
+            </a:r>
+            <a:r>
+              <a:rPr lang="en-US" sz="2800" dirty="0" err="1"/>
+              <a:t>Biham</a:t>
+            </a:r>
+            <a:r>
+              <a:rPr lang="en-US" sz="2800" dirty="0"/>
+              <a:t> in 1995. It produces a fixed-size hash value of 192 bits. Tiger is considered to be secure and efficient, and it has been used in various applications where data integrity and security are important.</a:t>
+            </a:r>
+          </a:p>
+          <a:p>
+            <a:endParaRPr lang="en-US" sz="2800" dirty="0"/>
+          </a:p>
+        </p:txBody>
+      </p:sp>
+    </p:spTree>
+    <p:extLst>
+      <p:ext uri="{BB962C8B-B14F-4D97-AF65-F5344CB8AC3E}">
+        <p14:creationId xmlns:p14="http://schemas.microsoft.com/office/powerpoint/2010/main" val="3357509561"/>
+      </p:ext>
+    </p:extLst>
+  </p:cSld>
+  <p:clrMapOvr>
+    <a:masterClrMapping/>
+  </p:clrMapOvr>
+</p:sld>
+</file>
+
+<file path=ppt/slides/slide39.xml><?xml version="1.0" encoding="utf-8"?>
+<p:sld xmlns:a="http://schemas.openxmlformats.org/drawingml/2006/main" xmlns:r="http://schemas.openxmlformats.org/officeDocument/2006/relationships" xmlns:p="http://schemas.openxmlformats.org/presentationml/2006/main">
+  <p:cSld>
+    <p:spTree>
+      <p:nvGrpSpPr>
+        <p:cNvPr id="1" name=""/>
+        <p:cNvGrpSpPr/>
+        <p:nvPr/>
+      </p:nvGrpSpPr>
+      <p:grpSpPr>
+        <a:xfrm>
+          <a:off x="0" y="0"/>
+          <a:ext cx="0" cy="0"/>
+          <a:chOff x="0" y="0"/>
+          <a:chExt cx="0" cy="0"/>
+        </a:xfrm>
+      </p:grpSpPr>
+      <p:sp>
+        <p:nvSpPr>
+          <p:cNvPr id="2" name="Title 1">
+            <a:extLst>
+              <a:ext uri="{FF2B5EF4-FFF2-40B4-BE49-F238E27FC236}">
+                <a16:creationId xmlns:a16="http://schemas.microsoft.com/office/drawing/2014/main" id="{7F9FAD0A-0108-7CE1-B151-3265FC25AC12}"/>
+              </a:ext>
+            </a:extLst>
+          </p:cNvPr>
+          <p:cNvSpPr>
+            <a:spLocks noGrp="1"/>
+          </p:cNvSpPr>
+          <p:nvPr>
+            <p:ph type="title"/>
+          </p:nvPr>
+        </p:nvSpPr>
+        <p:spPr/>
+        <p:txBody>
+          <a:bodyPr/>
+          <a:lstStyle/>
+          <a:p>
+            <a:r>
+              <a:rPr lang="en-US" dirty="0"/>
+              <a:t>Here's how Tiger works as a hash function:</a:t>
+            </a:r>
+          </a:p>
+        </p:txBody>
+      </p:sp>
+      <p:sp>
+        <p:nvSpPr>
+          <p:cNvPr id="3" name="Content Placeholder 2">
+            <a:extLst>
+              <a:ext uri="{FF2B5EF4-FFF2-40B4-BE49-F238E27FC236}">
+                <a16:creationId xmlns:a16="http://schemas.microsoft.com/office/drawing/2014/main" id="{EF830652-F7B5-9297-CF06-2611CB4AD6FB}"/>
+              </a:ext>
+            </a:extLst>
+          </p:cNvPr>
+          <p:cNvSpPr>
+            <a:spLocks noGrp="1"/>
+          </p:cNvSpPr>
+          <p:nvPr>
+            <p:ph idx="1"/>
+          </p:nvPr>
+        </p:nvSpPr>
+        <p:spPr>
+          <a:xfrm>
+            <a:off x="913795" y="1580051"/>
+            <a:ext cx="10353762" cy="4668350"/>
+          </a:xfrm>
+        </p:spPr>
+        <p:txBody>
+          <a:bodyPr anchor="ctr">
+            <a:normAutofit/>
+          </a:bodyPr>
+          <a:lstStyle/>
+          <a:p>
+            <a:r>
+              <a:rPr lang="en-US" sz="2200" dirty="0"/>
+              <a:t>Initialization: Tiger initializes three 64-bit registers, often denoted as A, B, and C, with specific constant values. These registers are used to store intermediate hash values during the computation.</a:t>
+            </a:r>
+          </a:p>
+          <a:p>
+            <a:r>
+              <a:rPr lang="en-US" sz="2200" dirty="0"/>
+              <a:t>Processing the Data in Blocks: Tiger processes the input message in blocks of 512 bits (64 bytes). If the message is not a multiple of 512 bits, padding is applied to make the message a multiple of the block size. </a:t>
+            </a:r>
+          </a:p>
+          <a:p>
+            <a:r>
+              <a:rPr lang="en-US" sz="2200" dirty="0"/>
+              <a:t>Compression Function: The compression function operates on each block of the message. It involves several rounds of mixing and permutation operations, where the data is combined with the values in the registers in a non-linear manner.</a:t>
+            </a:r>
+          </a:p>
+          <a:p>
+            <a:r>
+              <a:rPr lang="en-US" sz="2200" dirty="0"/>
+              <a:t>Finalization: After processing all blocks, the final values in the A, B, and C registers are concatenated to form the 192-bit hash value.</a:t>
+            </a:r>
+          </a:p>
+        </p:txBody>
+      </p:sp>
+    </p:spTree>
+    <p:extLst>
+      <p:ext uri="{BB962C8B-B14F-4D97-AF65-F5344CB8AC3E}">
+        <p14:creationId xmlns:p14="http://schemas.microsoft.com/office/powerpoint/2010/main" val="3394950167"/>
       </p:ext>
     </p:extLst>
   </p:cSld>
@@ -24167,6 +25648,234 @@
     <p:extLst>
       <p:ext uri="{BB962C8B-B14F-4D97-AF65-F5344CB8AC3E}">
         <p14:creationId xmlns:p14="http://schemas.microsoft.com/office/powerpoint/2010/main" val="614700221"/>
+      </p:ext>
+    </p:extLst>
+  </p:cSld>
+  <p:clrMapOvr>
+    <a:masterClrMapping/>
+  </p:clrMapOvr>
+</p:sld>
+</file>
+
+<file path=ppt/slides/slide40.xml><?xml version="1.0" encoding="utf-8"?>
+<p:sld xmlns:a="http://schemas.openxmlformats.org/drawingml/2006/main" xmlns:r="http://schemas.openxmlformats.org/officeDocument/2006/relationships" xmlns:p="http://schemas.openxmlformats.org/presentationml/2006/main">
+  <p:cSld>
+    <p:spTree>
+      <p:nvGrpSpPr>
+        <p:cNvPr id="1" name=""/>
+        <p:cNvGrpSpPr/>
+        <p:nvPr/>
+      </p:nvGrpSpPr>
+      <p:grpSpPr>
+        <a:xfrm>
+          <a:off x="0" y="0"/>
+          <a:ext cx="0" cy="0"/>
+          <a:chOff x="0" y="0"/>
+          <a:chExt cx="0" cy="0"/>
+        </a:xfrm>
+      </p:grpSpPr>
+      <p:sp>
+        <p:nvSpPr>
+          <p:cNvPr id="2" name="Title 1">
+            <a:extLst>
+              <a:ext uri="{FF2B5EF4-FFF2-40B4-BE49-F238E27FC236}">
+                <a16:creationId xmlns:a16="http://schemas.microsoft.com/office/drawing/2014/main" id="{EAC450FF-8F7F-34C7-7121-BAB061138F94}"/>
+              </a:ext>
+            </a:extLst>
+          </p:cNvPr>
+          <p:cNvSpPr>
+            <a:spLocks noGrp="1"/>
+          </p:cNvSpPr>
+          <p:nvPr>
+            <p:ph type="title"/>
+          </p:nvPr>
+        </p:nvSpPr>
+        <p:spPr/>
+        <p:txBody>
+          <a:bodyPr/>
+          <a:lstStyle/>
+          <a:p>
+            <a:r>
+              <a:rPr lang="en-US" dirty="0"/>
+              <a:t>Advantages of Tiger Hash Function:</a:t>
+            </a:r>
+          </a:p>
+        </p:txBody>
+      </p:sp>
+      <p:sp>
+        <p:nvSpPr>
+          <p:cNvPr id="3" name="Content Placeholder 2">
+            <a:extLst>
+              <a:ext uri="{FF2B5EF4-FFF2-40B4-BE49-F238E27FC236}">
+                <a16:creationId xmlns:a16="http://schemas.microsoft.com/office/drawing/2014/main" id="{007134B9-3A7C-EA99-FC06-0CBA883CF6C5}"/>
+              </a:ext>
+            </a:extLst>
+          </p:cNvPr>
+          <p:cNvSpPr>
+            <a:spLocks noGrp="1"/>
+          </p:cNvSpPr>
+          <p:nvPr>
+            <p:ph idx="1"/>
+          </p:nvPr>
+        </p:nvSpPr>
+        <p:spPr>
+          <a:xfrm>
+            <a:off x="726528" y="1580050"/>
+            <a:ext cx="10728295" cy="4668350"/>
+          </a:xfrm>
+        </p:spPr>
+        <p:txBody>
+          <a:bodyPr anchor="ctr">
+            <a:noAutofit/>
+          </a:bodyPr>
+          <a:lstStyle/>
+          <a:p>
+            <a:r>
+              <a:rPr lang="en-US" dirty="0"/>
+              <a:t>Security: Tiger was designed with a focus on security and has undergone extensive analysis. While it might not be as well-known as SHA-2 or SHA-3, it is still considered a secure hash function. </a:t>
+            </a:r>
+          </a:p>
+          <a:p>
+            <a:r>
+              <a:rPr lang="en-US" dirty="0"/>
+              <a:t>Efficiency: Tiger is relatively efficient in terms of computational resources. It performs well in software implementations and can be faster than some other hash functions, especially on platforms where bitwise operations are fast. </a:t>
+            </a:r>
+          </a:p>
+          <a:p>
+            <a:r>
+              <a:rPr lang="en-US" dirty="0"/>
+              <a:t>Versatility: Tiger produces a 192-bit hash value, which is longer than MD5 (128-bit) and SHA-1 (160-bit). This longer hash can provide a higher level of collision resistance, making it suitable for applications where this property is important. </a:t>
+            </a:r>
+          </a:p>
+          <a:p>
+            <a:r>
+              <a:rPr lang="en-US" dirty="0"/>
+              <a:t>Simple Design: Tiger has a relatively simple and straightforward design, making it easier to implement and understand compared to more complex hash functions. </a:t>
+            </a:r>
+          </a:p>
+          <a:p>
+            <a:r>
+              <a:rPr lang="en-US" dirty="0"/>
+              <a:t>Checksum Verification: Tiger hash values can be used to verify data integrity and detect accidental changes or corruption in files or data transmission. It's commonly used in error-checking applications.</a:t>
+            </a:r>
+          </a:p>
+        </p:txBody>
+      </p:sp>
+    </p:spTree>
+    <p:extLst>
+      <p:ext uri="{BB962C8B-B14F-4D97-AF65-F5344CB8AC3E}">
+        <p14:creationId xmlns:p14="http://schemas.microsoft.com/office/powerpoint/2010/main" val="4070209764"/>
+      </p:ext>
+    </p:extLst>
+  </p:cSld>
+  <p:clrMapOvr>
+    <a:masterClrMapping/>
+  </p:clrMapOvr>
+</p:sld>
+</file>
+
+<file path=ppt/slides/slide41.xml><?xml version="1.0" encoding="utf-8"?>
+<p:sld xmlns:a="http://schemas.openxmlformats.org/drawingml/2006/main" xmlns:r="http://schemas.openxmlformats.org/officeDocument/2006/relationships" xmlns:p="http://schemas.openxmlformats.org/presentationml/2006/main">
+  <p:cSld>
+    <p:spTree>
+      <p:nvGrpSpPr>
+        <p:cNvPr id="1" name=""/>
+        <p:cNvGrpSpPr/>
+        <p:nvPr/>
+      </p:nvGrpSpPr>
+      <p:grpSpPr>
+        <a:xfrm>
+          <a:off x="0" y="0"/>
+          <a:ext cx="0" cy="0"/>
+          <a:chOff x="0" y="0"/>
+          <a:chExt cx="0" cy="0"/>
+        </a:xfrm>
+      </p:grpSpPr>
+      <p:sp>
+        <p:nvSpPr>
+          <p:cNvPr id="2" name="Title 1">
+            <a:extLst>
+              <a:ext uri="{FF2B5EF4-FFF2-40B4-BE49-F238E27FC236}">
+                <a16:creationId xmlns:a16="http://schemas.microsoft.com/office/drawing/2014/main" id="{EAC450FF-8F7F-34C7-7121-BAB061138F94}"/>
+              </a:ext>
+            </a:extLst>
+          </p:cNvPr>
+          <p:cNvSpPr>
+            <a:spLocks noGrp="1"/>
+          </p:cNvSpPr>
+          <p:nvPr>
+            <p:ph type="title"/>
+          </p:nvPr>
+        </p:nvSpPr>
+        <p:spPr/>
+        <p:txBody>
+          <a:bodyPr/>
+          <a:lstStyle/>
+          <a:p>
+            <a:r>
+              <a:rPr lang="en-US" dirty="0"/>
+              <a:t>Disadvantages of Tiger Hash Function:</a:t>
+            </a:r>
+          </a:p>
+        </p:txBody>
+      </p:sp>
+      <p:sp>
+        <p:nvSpPr>
+          <p:cNvPr id="3" name="Content Placeholder 2">
+            <a:extLst>
+              <a:ext uri="{FF2B5EF4-FFF2-40B4-BE49-F238E27FC236}">
+                <a16:creationId xmlns:a16="http://schemas.microsoft.com/office/drawing/2014/main" id="{007134B9-3A7C-EA99-FC06-0CBA883CF6C5}"/>
+              </a:ext>
+            </a:extLst>
+          </p:cNvPr>
+          <p:cNvSpPr>
+            <a:spLocks noGrp="1"/>
+          </p:cNvSpPr>
+          <p:nvPr>
+            <p:ph idx="1"/>
+          </p:nvPr>
+        </p:nvSpPr>
+        <p:spPr>
+          <a:xfrm>
+            <a:off x="726528" y="1580050"/>
+            <a:ext cx="10728295" cy="4668350"/>
+          </a:xfrm>
+        </p:spPr>
+        <p:txBody>
+          <a:bodyPr anchor="ctr">
+            <a:noAutofit/>
+          </a:bodyPr>
+          <a:lstStyle/>
+          <a:p>
+            <a:r>
+              <a:rPr lang="en-US" sz="2000" dirty="0"/>
+              <a:t>Limited Adoption: Tiger is not as widely adopted as some other hash functions like SHA-2 or SHA-3. This means there might be fewer tools, libraries, and community support available compared to more commonly used hash functions. </a:t>
+            </a:r>
+          </a:p>
+          <a:p>
+            <a:r>
+              <a:rPr lang="en-US" sz="2000" dirty="0"/>
+              <a:t>Non-Standardization: Tiger is not a NIST standard. While this doesn't necessarily mean it's insecure, standards compliance can be a critical factor in certain applications where interoperability and compliance are required. </a:t>
+            </a:r>
+          </a:p>
+          <a:p>
+            <a:r>
+              <a:rPr lang="en-US" sz="2000" dirty="0"/>
+              <a:t>Limited Hash Length Options: Tiger produces a fixed- length hash of 192 bits. While this length is longer than MD5 and SHA-1, it might not provide the same level of security as longer hash functions like SHA-256 (256-bit) or SHA-3 (e.g., 256-bit or 512-bit versions) in certain use cases. </a:t>
+            </a:r>
+          </a:p>
+          <a:p>
+            <a:r>
+              <a:rPr lang="en-US" sz="2000" dirty="0"/>
+              <a:t>Cryptographic Vulnerabilities: While no major vulnerabilities have been discovered in Tiger, it's worth noting that as technology advances, new attack methods might be found that could potentially weaken its security.</a:t>
+            </a:r>
+          </a:p>
+        </p:txBody>
+      </p:sp>
+    </p:spTree>
+    <p:extLst>
+      <p:ext uri="{BB962C8B-B14F-4D97-AF65-F5344CB8AC3E}">
+        <p14:creationId xmlns:p14="http://schemas.microsoft.com/office/powerpoint/2010/main" val="3547974190"/>
       </p:ext>
     </p:extLst>
   </p:cSld>
@@ -24422,12 +26131,12 @@
               </a:lnSpc>
             </a:pPr>
             <a:r>
-              <a:rPr lang="en-US" sz="3200" b="0" i="0" dirty="0">
+              <a:rPr lang="en-US" sz="2800" b="0" i="0" dirty="0">
                 <a:solidFill>
                   <a:srgbClr val="D1D5DB"/>
                 </a:solidFill>
                 <a:effectLst/>
-                <a:latin typeface="Söhne"/>
+                <a:latin typeface="Calisto MT (Body)"/>
               </a:rPr>
               <a:t>Hashing is used in cybersecurity for malware detection.</a:t>
             </a:r>
@@ -24439,23 +26148,23 @@
               </a:lnSpc>
               <a:buNone/>
             </a:pPr>
-            <a:endParaRPr lang="en-US" sz="1400" b="0" i="0" dirty="0">
+            <a:endParaRPr lang="en-US" sz="1200" b="0" i="0" dirty="0">
               <a:solidFill>
                 <a:srgbClr val="D1D5DB"/>
               </a:solidFill>
               <a:effectLst/>
-              <a:latin typeface="Söhne"/>
+              <a:latin typeface="Calisto MT (Body)"/>
             </a:endParaRPr>
           </a:p>
           <a:p>
             <a:pPr marL="914400" lvl="1" indent="-457200"/>
             <a:r>
-              <a:rPr lang="en-US" sz="3200" b="0" i="0" dirty="0">
+              <a:rPr lang="en-US" sz="2800" b="0" i="0" dirty="0">
                 <a:solidFill>
                   <a:srgbClr val="D1D5DB"/>
                 </a:solidFill>
                 <a:effectLst/>
-                <a:latin typeface="Söhne"/>
+                <a:latin typeface="Calisto MT (Body)"/>
               </a:rPr>
               <a:t>Antivirus programs often use hash databases to compare the hash values of files on a system against known malicious files. If a match is found, it can indicate the presence of malware.</a:t>
             </a:r>
@@ -24557,7 +26266,7 @@
                   <a:srgbClr val="D1D5DB"/>
                 </a:solidFill>
                 <a:effectLst/>
-                <a:latin typeface="Söhne"/>
+                <a:latin typeface="Calisto MT (Body)"/>
               </a:rPr>
               <a:t>Many cryptographic protocols like SSH and HTTPS use hash functions to ensure security.</a:t>
             </a:r>
@@ -24571,7 +26280,7 @@
                 <a:srgbClr val="D1D5DB"/>
               </a:solidFill>
               <a:effectLst/>
-              <a:latin typeface="Söhne"/>
+              <a:latin typeface="Calisto MT (Body)"/>
             </a:endParaRPr>
           </a:p>
           <a:p>
@@ -24582,7 +26291,7 @@
                   <a:srgbClr val="D1D5DB"/>
                 </a:solidFill>
                 <a:effectLst/>
-                <a:latin typeface="Söhne"/>
+                <a:latin typeface="Calisto MT (Body)"/>
               </a:rPr>
               <a:t>For example, secure key exchange protocols like Diffie-Hellman key exchange (</a:t>
             </a:r>
@@ -24592,7 +26301,7 @@
                   <a:srgbClr val="D1D5DB"/>
                 </a:solidFill>
                 <a:effectLst/>
-                <a:latin typeface="Söhne"/>
+                <a:latin typeface="Calisto MT (Body)"/>
               </a:rPr>
               <a:t>For two parties to communicate confidentially, they must first exchange the secret key so that each party is able to encrypt messages before sending, and decrypt received ones. This process is known as the key exchange.</a:t>
             </a:r>
@@ -24602,7 +26311,7 @@
                   <a:srgbClr val="D1D5DB"/>
                 </a:solidFill>
                 <a:effectLst/>
-                <a:latin typeface="Söhne"/>
+                <a:latin typeface="Calisto MT (Body)"/>
               </a:rPr>
               <a:t>) may use hashes to verify the integrity of exchanged messages and prevent man-in-the-middle attacks.</a:t>
             </a:r>
@@ -24697,7 +26406,7 @@
           </a:bodyPr>
           <a:lstStyle/>
           <a:p>
-            <a:pPr marL="742950" lvl="1" indent="-285750"/>
+            <a:pPr marL="914400" lvl="1" indent="-457200"/>
             <a:r>
               <a:rPr lang="en-US" sz="3200" b="0" i="0" dirty="0">
                 <a:solidFill>
@@ -24706,14 +26415,24 @@
                 <a:effectLst/>
                 <a:latin typeface="Söhne"/>
               </a:rPr>
-              <a:t>Blockchain relies heavily on hashing for creating secure blocks.</a:t>
+              <a:t>Blockchain relies heavily on hashing for creating secure </a:t>
+            </a:r>
+            <a:r>
+              <a:rPr lang="en-US" sz="3200" i="0" dirty="0">
+                <a:solidFill>
+                  <a:srgbClr val="D1D5DB"/>
+                </a:solidFill>
+                <a:effectLst/>
+                <a:latin typeface="Söhne"/>
+              </a:rPr>
+              <a:t>blocks.</a:t>
             </a:r>
           </a:p>
           <a:p>
             <a:pPr marL="457200" lvl="1" indent="0">
               <a:buNone/>
             </a:pPr>
-            <a:endParaRPr lang="en-US" sz="2000" b="0" i="0" dirty="0">
+            <a:endParaRPr lang="en-US" sz="2000" i="0" dirty="0">
               <a:solidFill>
                 <a:srgbClr val="D1D5DB"/>
               </a:solidFill>
@@ -24722,9 +26441,9 @@
             </a:endParaRPr>
           </a:p>
           <a:p>
-            <a:pPr marL="742950" lvl="1" indent="-285750"/>
-            <a:r>
-              <a:rPr lang="en-US" sz="3200" b="0" i="0" dirty="0">
+            <a:pPr marL="914400" lvl="1" indent="-457200"/>
+            <a:r>
+              <a:rPr lang="en-US" sz="3200" i="0" dirty="0">
                 <a:solidFill>
                   <a:srgbClr val="D1D5DB"/>
                 </a:solidFill>
@@ -24880,7 +26599,7 @@
             <p:ph idx="1"/>
             <p:extLst>
               <p:ext uri="{D42A27DB-BD31-4B8C-83A1-F6EECF244321}">
-                <p14:modId xmlns:p14="http://schemas.microsoft.com/office/powerpoint/2010/main" val="1349265711"/>
+                <p14:modId xmlns:p14="http://schemas.microsoft.com/office/powerpoint/2010/main" val="1779727118"/>
               </p:ext>
             </p:extLst>
           </p:nvPr>

</xml_diff>